<commit_message>
Upd dummy content p2 and p6
</commit_message>
<xml_diff>
--- a/P6/event_plan/dist/plan_80nam_A90.pptx
+++ b/P6/event_plan/dist/plan_80nam_A90.pptx
@@ -21,6 +21,8 @@
     <p:sldId id="269" r:id="rId20"/>
     <p:sldId id="270" r:id="rId21"/>
     <p:sldId id="271" r:id="rId22"/>
+    <p:sldId id="272" r:id="rId23"/>
+    <p:sldId id="273" r:id="rId24"/>
   </p:sldIdLst>
   <p:sldSz cx="9144000" cy="6858000" type="screen4x3"/>
   <p:notesSz cx="6858000" cy="9144000"/>
@@ -3148,7 +3150,93 @@
       </p:sp>
       <p:sp>
         <p:nvSpPr>
-          <p:cNvPr id="3" name="TextBox 2"/>
+          <p:cNvPr id="3" name="5-Point Star 2"/>
+          <p:cNvSpPr/>
+          <p:nvPr/>
+        </p:nvSpPr>
+        <p:spPr>
+          <a:xfrm>
+            <a:off x="457200" y="457200"/>
+            <a:ext cx="914400" cy="914400"/>
+          </a:xfrm>
+          <a:prstGeom prst="star5">
+            <a:avLst/>
+          </a:prstGeom>
+          <a:solidFill>
+            <a:srgbClr val="FFD200"/>
+          </a:solidFill>
+          <a:ln>
+            <a:noFill/>
+          </a:ln>
+        </p:spPr>
+        <p:style>
+          <a:lnRef idx="1">
+            <a:schemeClr val="accent1"/>
+          </a:lnRef>
+          <a:fillRef idx="3">
+            <a:schemeClr val="accent1"/>
+          </a:fillRef>
+          <a:effectRef idx="2">
+            <a:schemeClr val="accent1"/>
+          </a:effectRef>
+          <a:fontRef idx="minor">
+            <a:schemeClr val="lt1"/>
+          </a:fontRef>
+        </p:style>
+        <p:txBody>
+          <a:bodyPr rtlCol="0" anchor="ctr"/>
+          <a:lstStyle/>
+          <a:p>
+            <a:pPr algn="ctr"/>
+          </a:p>
+        </p:txBody>
+      </p:sp>
+      <p:sp>
+        <p:nvSpPr>
+          <p:cNvPr id="4" name="Rectangle 3"/>
+          <p:cNvSpPr/>
+          <p:nvPr/>
+        </p:nvSpPr>
+        <p:spPr>
+          <a:xfrm>
+            <a:off x="91440" y="91440"/>
+            <a:ext cx="8961120" cy="6675120"/>
+          </a:xfrm>
+          <a:prstGeom prst="rect">
+            <a:avLst/>
+          </a:prstGeom>
+          <a:noFill/>
+          <a:ln w="38100">
+            <a:solidFill>
+              <a:srgbClr val="FFD200"/>
+            </a:solidFill>
+          </a:ln>
+        </p:spPr>
+        <p:style>
+          <a:lnRef idx="1">
+            <a:schemeClr val="accent1"/>
+          </a:lnRef>
+          <a:fillRef idx="3">
+            <a:schemeClr val="accent1"/>
+          </a:fillRef>
+          <a:effectRef idx="2">
+            <a:schemeClr val="accent1"/>
+          </a:effectRef>
+          <a:fontRef idx="minor">
+            <a:schemeClr val="lt1"/>
+          </a:fontRef>
+        </p:style>
+        <p:txBody>
+          <a:bodyPr rtlCol="0" anchor="ctr"/>
+          <a:lstStyle/>
+          <a:p>
+            <a:pPr algn="ctr"/>
+          </a:p>
+        </p:txBody>
+      </p:sp>
+      <p:sp>
+        <p:nvSpPr>
+          <p:cNvPr id="5" name="TextBox 4"/>
           <p:cNvSpPr txBox="1"/>
           <p:nvPr/>
         </p:nvSpPr>
@@ -3176,7 +3264,7 @@
               </a:defRPr>
             </a:pPr>
             <a:r>
-              <a:t>Kế hoạch Kỷ niệm 80 năm Quốc khánh 2/9</a:t>
+              <a:t>Kế hoạch Tổ chức Lễ Kỷ niệm 80 năm Ngày Quốc khánh nước Cộng hòa Xã hội Chủ nghĩa Việt Nam (2/9/1945 - 2/9/2025)</a:t>
             </a:r>
           </a:p>
           <a:p>
@@ -3284,7 +3372,7 @@
               </a:defRPr>
             </a:pPr>
             <a:r>
-              <a:t>Rủi ro chính &amp; Ứng phó</a:t>
+              <a:t>Ngân sách (dự trù)</a:t>
             </a:r>
           </a:p>
         </p:txBody>
@@ -3298,7 +3386,7 @@
         <p:spPr>
           <a:xfrm>
             <a:off x="731520" y="1645920"/>
-            <a:ext cx="10789920" cy="914400"/>
+            <a:ext cx="10789920" cy="731520"/>
           </a:xfrm>
           <a:prstGeom prst="rect">
             <a:avLst/>
@@ -3312,26 +3400,14 @@
           <a:lstStyle/>
           <a:p>
             <a:pPr>
-              <a:defRPr sz="2000" b="1">
-                <a:solidFill>
-                  <a:srgbClr val="E60000"/>
-                </a:solidFill>
-              </a:defRPr>
-            </a:pPr>
-            <a:r>
-              <a:t>Thời tiết bất lợi — Tác động: Cao — Xác suất: Trung bình</a:t>
-            </a:r>
-          </a:p>
-          <a:p>
-            <a:pPr lvl="1">
-              <a:defRPr sz="1800">
+              <a:defRPr sz="2000">
                 <a:solidFill>
                   <a:srgbClr val="141414"/>
                 </a:solidFill>
               </a:defRPr>
             </a:pPr>
             <a:r>
-              <a:t>Ứng phó: Chuẩn bị phương án dự phòng trong nhà và lều che</a:t>
+              <a:t>Tổ chức sự kiện: 3.000.000.000 VNĐ (Bao gồm thuê địa điểm, thiết bị, nhân lực)</a:t>
             </a:r>
           </a:p>
         </p:txBody>
@@ -3344,8 +3420,8 @@
         </p:nvSpPr>
         <p:spPr>
           <a:xfrm>
-            <a:off x="731520" y="2743200"/>
-            <a:ext cx="10789920" cy="914400"/>
+            <a:off x="731520" y="2560320"/>
+            <a:ext cx="10789920" cy="731520"/>
           </a:xfrm>
           <a:prstGeom prst="rect">
             <a:avLst/>
@@ -3359,26 +3435,14 @@
           <a:lstStyle/>
           <a:p>
             <a:pPr>
-              <a:defRPr sz="2000" b="1">
-                <a:solidFill>
-                  <a:srgbClr val="E60000"/>
-                </a:solidFill>
-              </a:defRPr>
-            </a:pPr>
-            <a:r>
-              <a:t>An ninh trật tự — Tác động: Cao — Xác suất: Thấp</a:t>
-            </a:r>
-          </a:p>
-          <a:p>
-            <a:pPr lvl="1">
-              <a:defRPr sz="1800">
+              <a:defRPr sz="2000">
                 <a:solidFill>
                   <a:srgbClr val="141414"/>
                 </a:solidFill>
               </a:defRPr>
             </a:pPr>
             <a:r>
-              <a:t>Ứng phó: Tăng cường lực lượng bảo vệ và kiểm soát</a:t>
+              <a:t>Truyền thông: 800.000.000 VNĐ (Quảng cáo, sản xuất nội dung, phát sóng)</a:t>
             </a:r>
           </a:p>
         </p:txBody>
@@ -3391,8 +3455,8 @@
         </p:nvSpPr>
         <p:spPr>
           <a:xfrm>
-            <a:off x="731520" y="3840480"/>
-            <a:ext cx="10789920" cy="914400"/>
+            <a:off x="731520" y="3474720"/>
+            <a:ext cx="10789920" cy="731520"/>
           </a:xfrm>
           <a:prstGeom prst="rect">
             <a:avLst/>
@@ -3406,73 +3470,14 @@
           <a:lstStyle/>
           <a:p>
             <a:pPr>
-              <a:defRPr sz="2000" b="1">
-                <a:solidFill>
-                  <a:srgbClr val="E60000"/>
-                </a:solidFill>
-              </a:defRPr>
-            </a:pPr>
-            <a:r>
-              <a:t>Vượt ngân sách — Tác động: Trung bình — Xác suất: Trung bình</a:t>
-            </a:r>
-          </a:p>
-          <a:p>
-            <a:pPr lvl="1">
-              <a:defRPr sz="1800">
+              <a:defRPr sz="2000">
                 <a:solidFill>
                   <a:srgbClr val="141414"/>
                 </a:solidFill>
               </a:defRPr>
             </a:pPr>
             <a:r>
-              <a:t>Ứng phó: Kiểm soát chi phí chặt chẽ và dự trù kinh phí</a:t>
-            </a:r>
-          </a:p>
-        </p:txBody>
-      </p:sp>
-      <p:sp>
-        <p:nvSpPr>
-          <p:cNvPr id="7" name="TextBox 6"/>
-          <p:cNvSpPr txBox="1"/>
-          <p:nvPr/>
-        </p:nvSpPr>
-        <p:spPr>
-          <a:xfrm>
-            <a:off x="731520" y="4937760"/>
-            <a:ext cx="10789920" cy="914400"/>
-          </a:xfrm>
-          <a:prstGeom prst="rect">
-            <a:avLst/>
-          </a:prstGeom>
-          <a:noFill/>
-        </p:spPr>
-        <p:txBody>
-          <a:bodyPr wrap="none">
-            <a:spAutoFit/>
-          </a:bodyPr>
-          <a:lstStyle/>
-          <a:p>
-            <a:pPr>
-              <a:defRPr sz="2000" b="1">
-                <a:solidFill>
-                  <a:srgbClr val="E60000"/>
-                </a:solidFill>
-              </a:defRPr>
-            </a:pPr>
-            <a:r>
-              <a:t>Thiếu hụt nhân lực — Tác động: Trung bình — Xác suất: Thấp</a:t>
-            </a:r>
-          </a:p>
-          <a:p>
-            <a:pPr lvl="1">
-              <a:defRPr sz="1800">
-                <a:solidFill>
-                  <a:srgbClr val="141414"/>
-                </a:solidFill>
-              </a:defRPr>
-            </a:pPr>
-            <a:r>
-              <a:t>Ứng phó: Huy động sớm và đào tạo bổ sung</a:t>
+              <a:t>Hậu cần: 500.000.000 VNĐ (Vận chuyển, ăn uống, lưu trú)</a:t>
             </a:r>
           </a:p>
         </p:txBody>
@@ -3568,7 +3573,7 @@
               </a:defRPr>
             </a:pPr>
             <a:r>
-              <a:t>An toàn</a:t>
+              <a:t>Rủi ro chính &amp; Ứng phó</a:t>
             </a:r>
           </a:p>
         </p:txBody>
@@ -3581,8 +3586,8 @@
         </p:nvSpPr>
         <p:spPr>
           <a:xfrm>
-            <a:off x="731520" y="1280160"/>
-            <a:ext cx="10789920" cy="5303520"/>
+            <a:off x="731520" y="1645920"/>
+            <a:ext cx="10789920" cy="914400"/>
           </a:xfrm>
           <a:prstGeom prst="rect">
             <a:avLst/>
@@ -3596,50 +3601,73 @@
           <a:lstStyle/>
           <a:p>
             <a:pPr>
-              <a:defRPr sz="2200">
+              <a:defRPr sz="2000" b="1">
+                <a:solidFill>
+                  <a:srgbClr val="E60000"/>
+                </a:solidFill>
+              </a:defRPr>
+            </a:pPr>
+            <a:r>
+              <a:t>Thời tiết bất lợi — Tác động: Cao — Xác suất: Trung bình</a:t>
+            </a:r>
+          </a:p>
+          <a:p>
+            <a:pPr lvl="1">
+              <a:defRPr sz="1800">
                 <a:solidFill>
                   <a:srgbClr val="141414"/>
                 </a:solidFill>
               </a:defRPr>
             </a:pPr>
             <a:r>
-              <a:t>An toàn sức khỏe: Kiểm tra sức khỏe tham gia, chuẩn bị y tế tại chỗ</a:t>
-            </a:r>
-          </a:p>
+              <a:t>Ứng phó: Chuẩn bị phương án dự phòng trong nhà và lều che</a:t>
+            </a:r>
+          </a:p>
+        </p:txBody>
+      </p:sp>
+      <p:sp>
+        <p:nvSpPr>
+          <p:cNvPr id="5" name="TextBox 4"/>
+          <p:cNvSpPr txBox="1"/>
+          <p:nvPr/>
+        </p:nvSpPr>
+        <p:spPr>
+          <a:xfrm>
+            <a:off x="731520" y="2743200"/>
+            <a:ext cx="10789920" cy="914400"/>
+          </a:xfrm>
+          <a:prstGeom prst="rect">
+            <a:avLst/>
+          </a:prstGeom>
+          <a:noFill/>
+        </p:spPr>
+        <p:txBody>
+          <a:bodyPr wrap="none">
+            <a:spAutoFit/>
+          </a:bodyPr>
+          <a:lstStyle/>
           <a:p>
             <a:pPr>
-              <a:defRPr sz="2200">
+              <a:defRPr sz="2000" b="1">
+                <a:solidFill>
+                  <a:srgbClr val="E60000"/>
+                </a:solidFill>
+              </a:defRPr>
+            </a:pPr>
+            <a:r>
+              <a:t>An ninh trật tự — Tác động: Cao — Xác suất: Thấp</a:t>
+            </a:r>
+          </a:p>
+          <a:p>
+            <a:pPr lvl="1">
+              <a:defRPr sz="1800">
                 <a:solidFill>
                   <a:srgbClr val="141414"/>
                 </a:solidFill>
               </a:defRPr>
             </a:pPr>
             <a:r>
-              <a:t>An toàn giao thông: Phân luồng giao thông, hướng dẫn đỗ xe, điều phối lưu thông</a:t>
-            </a:r>
-          </a:p>
-          <a:p>
-            <a:pPr>
-              <a:defRPr sz="2200">
-                <a:solidFill>
-                  <a:srgbClr val="141414"/>
-                </a:solidFill>
-              </a:defRPr>
-            </a:pPr>
-            <a:r>
-              <a:t>An toàn cháy nổ: Kiểm tra hệ thống điện, chuẩn bị thiết bị chữa cháy</a:t>
-            </a:r>
-          </a:p>
-          <a:p>
-            <a:pPr>
-              <a:defRPr sz="2200">
-                <a:solidFill>
-                  <a:srgbClr val="141414"/>
-                </a:solidFill>
-              </a:defRPr>
-            </a:pPr>
-            <a:r>
-              <a:t>An toàn thực phẩm: Kiểm tra nguồn gốc, đảm bảo vệ sinh an toàn thực phẩm</a:t>
+              <a:t>Ứng phó: Tăng cường lực lượng bảo vệ và kiểm soát</a:t>
             </a:r>
           </a:p>
         </p:txBody>
@@ -3735,7 +3763,7 @@
               </a:defRPr>
             </a:pPr>
             <a:r>
-              <a:t>Bền vững</a:t>
+              <a:t>An toàn</a:t>
             </a:r>
           </a:p>
         </p:txBody>
@@ -3770,7 +3798,7 @@
               </a:defRPr>
             </a:pPr>
             <a:r>
-              <a:t>Môi trường: Sử dụng vật liệu thân thiện, tái chế rác thải, giảm thiểu ô nhiễm</a:t>
+              <a:t>An toàn sức khỏe: Kiểm tra sức khỏe tham gia, chuẩn bị y tế tại chỗ</a:t>
             </a:r>
           </a:p>
           <a:p>
@@ -3782,31 +3810,7 @@
               </a:defRPr>
             </a:pPr>
             <a:r>
-              <a:t>Tiết kiệm năng lượng: Sử dụng thiết bị tiết kiệm điện, năng lượng tái tạo</a:t>
-            </a:r>
-          </a:p>
-          <a:p>
-            <a:pPr>
-              <a:defRPr sz="2200">
-                <a:solidFill>
-                  <a:srgbClr val="141414"/>
-                </a:solidFill>
-              </a:defRPr>
-            </a:pPr>
-            <a:r>
-              <a:t>Giảm thiểu rác thải: Hạn chế sử dụng đồ nhựa, phân loại rác, tái sử dụng</a:t>
-            </a:r>
-          </a:p>
-          <a:p>
-            <a:pPr>
-              <a:defRPr sz="2200">
-                <a:solidFill>
-                  <a:srgbClr val="141414"/>
-                </a:solidFill>
-              </a:defRPr>
-            </a:pPr>
-            <a:r>
-              <a:t>Bảo tồn di sản: Bảo vệ các di tích lịch sử, không làm ảnh hưởng môi trường</a:t>
+              <a:t>An toàn giao thông: Phân luồng giao thông, hướng dẫn đỗ xe, điều phối lưu thông</a:t>
             </a:r>
           </a:p>
         </p:txBody>
@@ -3902,7 +3906,7 @@
               </a:defRPr>
             </a:pPr>
             <a:r>
-              <a:t>Ma trận RACI</a:t>
+              <a:t>Bền vững</a:t>
             </a:r>
           </a:p>
         </p:txBody>
@@ -3937,7 +3941,7 @@
               </a:defRPr>
             </a:pPr>
             <a:r>
-              <a:t>Lập kế hoạch tổng thể: R=Ban Chỉ đạo Trung ương, A=Ban Tổ chức Trung ương, C=Các bộ, ngành liên quan, I=Chính quyền địa phương</a:t>
+              <a:t>Môi trường: Sử dụng vật liệu thân thiện, tái chế rác thải, giảm thiểu ô nhiễm</a:t>
             </a:r>
           </a:p>
           <a:p>
@@ -3949,31 +3953,7 @@
               </a:defRPr>
             </a:pPr>
             <a:r>
-              <a:t>Tổ chức lễ kỷ niệm: R=Ban Tổ chức Trung ương, A=Đơn vị sự kiện chuyên nghiệp, C=Ban An ninh và Công an, I=Khách mời và người tham gia</a:t>
-            </a:r>
-          </a:p>
-          <a:p>
-            <a:pPr>
-              <a:defRPr sz="2200">
-                <a:solidFill>
-                  <a:srgbClr val="141414"/>
-                </a:solidFill>
-              </a:defRPr>
-            </a:pPr>
-            <a:r>
-              <a:t>Truyền thông: R=Ban Tuyên giáo Trung ương, A=Cơ quan báo chí truyền thông, C=Ban Tổ chức, I=Công chúng và người dân</a:t>
-            </a:r>
-          </a:p>
-          <a:p>
-            <a:pPr>
-              <a:defRPr sz="2200">
-                <a:solidFill>
-                  <a:srgbClr val="141414"/>
-                </a:solidFill>
-              </a:defRPr>
-            </a:pPr>
-            <a:r>
-              <a:t>Đảm bảo an ninh: R=Bộ Công an, A=Công an các cấp, C=Ban Tổ chức, I=Lực lượng dân quân tự vệ</a:t>
+              <a:t>Tiết kiệm năng lượng: Sử dụng thiết bị tiết kiệm điện, năng lượng tái tạo</a:t>
             </a:r>
           </a:p>
         </p:txBody>
@@ -4069,7 +4049,7 @@
               </a:defRPr>
             </a:pPr>
             <a:r>
-              <a:t>Chỉ số đo lường (KPI)</a:t>
+              <a:t>Ma trận RACI</a:t>
             </a:r>
           </a:p>
         </p:txBody>
@@ -4104,43 +4084,7 @@
               </a:defRPr>
             </a:pPr>
             <a:r>
-              <a:t>Số lượng người tham gia: Tổng số người tham dự các hoạt động kỷ niệm — Mục tiêu: ≥ 100.000 người</a:t>
-            </a:r>
-          </a:p>
-          <a:p>
-            <a:pPr>
-              <a:defRPr sz="2200">
-                <a:solidFill>
-                  <a:srgbClr val="141414"/>
-                </a:solidFill>
-              </a:defRPr>
-            </a:pPr>
-            <a:r>
-              <a:t>Độ phủ sóng truyền thông: Số lượng bài viết, lượt xem, chia sẻ trên các kênh — Mục tiêu: ≥ 1.000.000 lượt tiếp cận</a:t>
-            </a:r>
-          </a:p>
-          <a:p>
-            <a:pPr>
-              <a:defRPr sz="2200">
-                <a:solidFill>
-                  <a:srgbClr val="141414"/>
-                </a:solidFill>
-              </a:defRPr>
-            </a:pPr>
-            <a:r>
-              <a:t>Mức độ hài lòng: Đánh giá từ khách mời và người tham gia — Mục tiêu: ≥ 90% hài lòng</a:t>
-            </a:r>
-          </a:p>
-          <a:p>
-            <a:pPr>
-              <a:defRPr sz="2200">
-                <a:solidFill>
-                  <a:srgbClr val="141414"/>
-                </a:solidFill>
-              </a:defRPr>
-            </a:pPr>
-            <a:r>
-              <a:t>An toàn tuyệt đối: Không có sự cố an ninh, an toàn nào — Mục tiêu: 100% an toàn</a:t>
+              <a:t>Lập kế hoạch tổng thể: R=Ban Chỉ đạo Trung ương, A=Ban Tổ chức Trung ương, C=Các bộ, ngành liên quan, I=Chính quyền địa phương</a:t>
             </a:r>
           </a:p>
         </p:txBody>
@@ -4236,7 +4180,7 @@
               </a:defRPr>
             </a:pPr>
             <a:r>
-              <a:t>Cổng phê duyệt</a:t>
+              <a:t>Chỉ số đo lường (KPI)</a:t>
             </a:r>
           </a:p>
         </p:txBody>
@@ -4271,7 +4215,7 @@
               </a:defRPr>
             </a:pPr>
             <a:r>
-              <a:t>Cổng Phê duyệt kế hoạch tổng thể: Kế hoạch chi tiết, ngân sách hợp lý, đảm bảo an ninh — Chủ trì: Ban Chấp hành Trung ương Đảng</a:t>
+              <a:t>Số lượng người tham gia: Tổng số người tham dự các hoạt động kỷ niệm — Mục tiêu: ≥ 200.000 người</a:t>
             </a:r>
           </a:p>
           <a:p>
@@ -4283,31 +4227,7 @@
               </a:defRPr>
             </a:pPr>
             <a:r>
-              <a:t>Cổng Phê duyệt ngân sách: Ngân sách trong khả năng, hiệu quả cao, minh bạch — Chủ trì: Bộ Tài chính</a:t>
-            </a:r>
-          </a:p>
-          <a:p>
-            <a:pPr>
-              <a:defRPr sz="2200">
-                <a:solidFill>
-                  <a:srgbClr val="141414"/>
-                </a:solidFill>
-              </a:defRPr>
-            </a:pPr>
-            <a:r>
-              <a:t>Cổng Phê duyệt an ninh: Đảm bảo an ninh trật tự tuyệt đối — Chủ trì: Bộ Công an</a:t>
-            </a:r>
-          </a:p>
-          <a:p>
-            <a:pPr>
-              <a:defRPr sz="2200">
-                <a:solidFill>
-                  <a:srgbClr val="141414"/>
-                </a:solidFill>
-              </a:defRPr>
-            </a:pPr>
-            <a:r>
-              <a:t>Cổng Phê duyệt địa điểm: Phù hợp về mặt pháp lý và an toàn — Chủ trì: Chính quyền địa phương</a:t>
+              <a:t>Độ phủ sóng truyền thông: Số lượng bài viết, lượt xem, chia sẻ trên các kênh — Mục tiêu: ≥ 5.000.000 lượt tiếp cận</a:t>
             </a:r>
           </a:p>
         </p:txBody>
@@ -4345,6 +4265,387 @@
             <a:avLst/>
           </a:prstGeom>
           <a:solidFill>
+            <a:srgbClr val="F8F8F8"/>
+          </a:solidFill>
+          <a:ln>
+            <a:noFill/>
+          </a:ln>
+        </p:spPr>
+        <p:style>
+          <a:lnRef idx="1">
+            <a:schemeClr val="accent1"/>
+          </a:lnRef>
+          <a:fillRef idx="3">
+            <a:schemeClr val="accent1"/>
+          </a:fillRef>
+          <a:effectRef idx="2">
+            <a:schemeClr val="accent1"/>
+          </a:effectRef>
+          <a:fontRef idx="minor">
+            <a:schemeClr val="lt1"/>
+          </a:fontRef>
+        </p:style>
+        <p:txBody>
+          <a:bodyPr rtlCol="0" anchor="ctr"/>
+          <a:lstStyle/>
+          <a:p>
+            <a:pPr algn="ctr"/>
+          </a:p>
+        </p:txBody>
+      </p:sp>
+      <p:sp>
+        <p:nvSpPr>
+          <p:cNvPr id="3" name="TextBox 2"/>
+          <p:cNvSpPr txBox="1"/>
+          <p:nvPr/>
+        </p:nvSpPr>
+        <p:spPr>
+          <a:xfrm>
+            <a:off x="731520" y="365760"/>
+            <a:ext cx="10789920" cy="914400"/>
+          </a:xfrm>
+          <a:prstGeom prst="rect">
+            <a:avLst/>
+          </a:prstGeom>
+          <a:noFill/>
+        </p:spPr>
+        <p:txBody>
+          <a:bodyPr wrap="none">
+            <a:spAutoFit/>
+          </a:bodyPr>
+          <a:lstStyle/>
+          <a:p>
+            <a:pPr algn="ctr">
+              <a:defRPr sz="3600" b="1">
+                <a:solidFill>
+                  <a:srgbClr val="E60000"/>
+                </a:solidFill>
+              </a:defRPr>
+            </a:pPr>
+            <a:r>
+              <a:t>Cổng phê duyệt</a:t>
+            </a:r>
+          </a:p>
+        </p:txBody>
+      </p:sp>
+      <p:sp>
+        <p:nvSpPr>
+          <p:cNvPr id="4" name="TextBox 3"/>
+          <p:cNvSpPr txBox="1"/>
+          <p:nvPr/>
+        </p:nvSpPr>
+        <p:spPr>
+          <a:xfrm>
+            <a:off x="731520" y="1280160"/>
+            <a:ext cx="10789920" cy="5303520"/>
+          </a:xfrm>
+          <a:prstGeom prst="rect">
+            <a:avLst/>
+          </a:prstGeom>
+          <a:noFill/>
+        </p:spPr>
+        <p:txBody>
+          <a:bodyPr wrap="none">
+            <a:spAutoFit/>
+          </a:bodyPr>
+          <a:lstStyle/>
+          <a:p>
+            <a:pPr>
+              <a:defRPr sz="2200">
+                <a:solidFill>
+                  <a:srgbClr val="141414"/>
+                </a:solidFill>
+              </a:defRPr>
+            </a:pPr>
+            <a:r>
+              <a:t>Cổng Phê duyệt kế hoạch tổng thể: Kế hoạch chi tiết, ngân sách hợp lý, đảm bảo an ninh — Chủ trì: Ban Chấp hành Trung ương Đảng</a:t>
+            </a:r>
+          </a:p>
+        </p:txBody>
+      </p:sp>
+    </p:spTree>
+  </p:cSld>
+  <p:clrMapOvr>
+    <a:masterClrMapping/>
+  </p:clrMapOvr>
+</p:sld>
+</file>
+
+<file path=ppt/slides/slide17.xml><?xml version="1.0" encoding="utf-8"?>
+<p:sld xmlns:a="http://schemas.openxmlformats.org/drawingml/2006/main" xmlns:p="http://schemas.openxmlformats.org/presentationml/2006/main" xmlns:r="http://schemas.openxmlformats.org/officeDocument/2006/relationships">
+  <p:cSld>
+    <p:spTree>
+      <p:nvGrpSpPr>
+        <p:cNvPr id="1" name=""/>
+        <p:cNvGrpSpPr/>
+        <p:nvPr/>
+      </p:nvGrpSpPr>
+      <p:grpSpPr/>
+      <p:sp>
+        <p:nvSpPr>
+          <p:cNvPr id="2" name="Rectangle 1"/>
+          <p:cNvSpPr/>
+          <p:nvPr/>
+        </p:nvSpPr>
+        <p:spPr>
+          <a:xfrm>
+            <a:off x="0" y="0"/>
+            <a:ext cx="9144000" cy="6858000"/>
+          </a:xfrm>
+          <a:prstGeom prst="rect">
+            <a:avLst/>
+          </a:prstGeom>
+          <a:solidFill>
+            <a:srgbClr val="F8F8F8"/>
+          </a:solidFill>
+        </p:spPr>
+        <p:style>
+          <a:lnRef idx="1">
+            <a:schemeClr val="accent1"/>
+          </a:lnRef>
+          <a:fillRef idx="3">
+            <a:schemeClr val="accent1"/>
+          </a:fillRef>
+          <a:effectRef idx="2">
+            <a:schemeClr val="accent1"/>
+          </a:effectRef>
+          <a:fontRef idx="minor">
+            <a:schemeClr val="lt1"/>
+          </a:fontRef>
+        </p:style>
+        <p:txBody>
+          <a:bodyPr rtlCol="0" anchor="ctr"/>
+          <a:lstStyle/>
+          <a:p>
+            <a:pPr algn="ctr"/>
+          </a:p>
+        </p:txBody>
+      </p:sp>
+      <p:sp>
+        <p:nvSpPr>
+          <p:cNvPr id="3" name="5-Point Star 2"/>
+          <p:cNvSpPr/>
+          <p:nvPr/>
+        </p:nvSpPr>
+        <p:spPr>
+          <a:xfrm>
+            <a:off x="457200" y="457200"/>
+            <a:ext cx="914400" cy="914400"/>
+          </a:xfrm>
+          <a:prstGeom prst="star5">
+            <a:avLst/>
+          </a:prstGeom>
+          <a:solidFill>
+            <a:srgbClr val="FFD200"/>
+          </a:solidFill>
+          <a:ln>
+            <a:noFill/>
+          </a:ln>
+        </p:spPr>
+        <p:style>
+          <a:lnRef idx="1">
+            <a:schemeClr val="accent1"/>
+          </a:lnRef>
+          <a:fillRef idx="3">
+            <a:schemeClr val="accent1"/>
+          </a:fillRef>
+          <a:effectRef idx="2">
+            <a:schemeClr val="accent1"/>
+          </a:effectRef>
+          <a:fontRef idx="minor">
+            <a:schemeClr val="lt1"/>
+          </a:fontRef>
+        </p:style>
+        <p:txBody>
+          <a:bodyPr rtlCol="0" anchor="ctr"/>
+          <a:lstStyle/>
+          <a:p>
+            <a:pPr algn="ctr"/>
+          </a:p>
+        </p:txBody>
+      </p:sp>
+      <p:sp>
+        <p:nvSpPr>
+          <p:cNvPr id="4" name="Rectangle 3"/>
+          <p:cNvSpPr/>
+          <p:nvPr/>
+        </p:nvSpPr>
+        <p:spPr>
+          <a:xfrm>
+            <a:off x="91440" y="91440"/>
+            <a:ext cx="8961120" cy="6675120"/>
+          </a:xfrm>
+          <a:prstGeom prst="rect">
+            <a:avLst/>
+          </a:prstGeom>
+          <a:noFill/>
+          <a:ln w="38100">
+            <a:solidFill>
+              <a:srgbClr val="FFD200"/>
+            </a:solidFill>
+          </a:ln>
+        </p:spPr>
+        <p:style>
+          <a:lnRef idx="1">
+            <a:schemeClr val="accent1"/>
+          </a:lnRef>
+          <a:fillRef idx="3">
+            <a:schemeClr val="accent1"/>
+          </a:fillRef>
+          <a:effectRef idx="2">
+            <a:schemeClr val="accent1"/>
+          </a:effectRef>
+          <a:fontRef idx="minor">
+            <a:schemeClr val="lt1"/>
+          </a:fontRef>
+        </p:style>
+        <p:txBody>
+          <a:bodyPr rtlCol="0" anchor="ctr"/>
+          <a:lstStyle/>
+          <a:p>
+            <a:pPr algn="ctr"/>
+          </a:p>
+        </p:txBody>
+      </p:sp>
+      <p:sp>
+        <p:nvSpPr>
+          <p:cNvPr id="5" name="TextBox 4"/>
+          <p:cNvSpPr txBox="1"/>
+          <p:nvPr/>
+        </p:nvSpPr>
+        <p:spPr>
+          <a:xfrm>
+            <a:off x="731520" y="365760"/>
+            <a:ext cx="10789920" cy="1097280"/>
+          </a:xfrm>
+          <a:prstGeom prst="rect">
+            <a:avLst/>
+          </a:prstGeom>
+          <a:noFill/>
+        </p:spPr>
+        <p:txBody>
+          <a:bodyPr wrap="none">
+            <a:spAutoFit/>
+          </a:bodyPr>
+          <a:lstStyle/>
+          <a:p>
+            <a:pPr algn="ctr">
+              <a:defRPr sz="3200" b="1">
+                <a:solidFill>
+                  <a:srgbClr val="E60000"/>
+                </a:solidFill>
+              </a:defRPr>
+            </a:pPr>
+            <a:r>
+              <a:t>Hành Trình 80 Năm</a:t>
+            </a:r>
+          </a:p>
+        </p:txBody>
+      </p:sp>
+      <p:sp>
+        <p:nvSpPr>
+          <p:cNvPr id="6" name="TextBox 5"/>
+          <p:cNvSpPr txBox="1"/>
+          <p:nvPr/>
+        </p:nvSpPr>
+        <p:spPr>
+          <a:xfrm>
+            <a:off x="731520" y="1645920"/>
+            <a:ext cx="10789920" cy="4572000"/>
+          </a:xfrm>
+          <a:prstGeom prst="rect">
+            <a:avLst/>
+          </a:prstGeom>
+          <a:noFill/>
+        </p:spPr>
+        <p:txBody>
+          <a:bodyPr wrap="none">
+            <a:spAutoFit/>
+          </a:bodyPr>
+          <a:lstStyle/>
+          <a:p>
+            <a:pPr>
+              <a:defRPr sz="2000" b="1">
+                <a:solidFill>
+                  <a:srgbClr val="141414"/>
+                </a:solidFill>
+              </a:defRPr>
+            </a:pPr>
+            <a:r>
+              <a:t>🏛️ Từ những năm tháng khói lửa đến hòa bình thịnh vượng</a:t>
+            </a:r>
+          </a:p>
+          <a:p>
+            <a:pPr>
+              <a:defRPr sz="2000" b="1">
+                <a:solidFill>
+                  <a:srgbClr val="141414"/>
+                </a:solidFill>
+              </a:defRPr>
+            </a:pPr>
+            <a:r>
+              <a:t>🏛️ Từ hy sinh anh dũng đến thành tựu vẻ vang</a:t>
+            </a:r>
+          </a:p>
+          <a:p>
+            <a:pPr>
+              <a:defRPr sz="2000" b="1">
+                <a:solidFill>
+                  <a:srgbClr val="141414"/>
+                </a:solidFill>
+              </a:defRPr>
+            </a:pPr>
+            <a:r>
+              <a:t>🏛️ Từ đất nước bị chia cắt đến thống nhất toàn vẹn</a:t>
+            </a:r>
+          </a:p>
+          <a:p>
+            <a:pPr>
+              <a:defRPr sz="2000" b="1">
+                <a:solidFill>
+                  <a:srgbClr val="141414"/>
+                </a:solidFill>
+              </a:defRPr>
+            </a:pPr>
+            <a:r>
+              <a:t>🏛️ Từ nghèo đói đến phát triển, từ lạc hậu đến hiện đại</a:t>
+            </a:r>
+          </a:p>
+        </p:txBody>
+      </p:sp>
+    </p:spTree>
+  </p:cSld>
+  <p:clrMapOvr>
+    <a:masterClrMapping/>
+  </p:clrMapOvr>
+</p:sld>
+</file>
+
+<file path=ppt/slides/slide18.xml><?xml version="1.0" encoding="utf-8"?>
+<p:sld xmlns:a="http://schemas.openxmlformats.org/drawingml/2006/main" xmlns:p="http://schemas.openxmlformats.org/presentationml/2006/main" xmlns:r="http://schemas.openxmlformats.org/officeDocument/2006/relationships">
+  <p:cSld>
+    <p:spTree>
+      <p:nvGrpSpPr>
+        <p:cNvPr id="1" name=""/>
+        <p:cNvGrpSpPr/>
+        <p:nvPr/>
+      </p:nvGrpSpPr>
+      <p:grpSpPr/>
+      <p:sp>
+        <p:nvSpPr>
+          <p:cNvPr id="2" name="Rectangle 1"/>
+          <p:cNvSpPr/>
+          <p:nvPr/>
+        </p:nvSpPr>
+        <p:spPr>
+          <a:xfrm>
+            <a:off x="0" y="0"/>
+            <a:ext cx="9144000" cy="6858000"/>
+          </a:xfrm>
+          <a:prstGeom prst="rect">
+            <a:avLst/>
+          </a:prstGeom>
+          <a:solidFill>
             <a:srgbClr val="E60000"/>
           </a:solidFill>
           <a:ln>
@@ -4375,14 +4676,100 @@
       </p:sp>
       <p:sp>
         <p:nvSpPr>
-          <p:cNvPr id="3" name="TextBox 2"/>
+          <p:cNvPr id="3" name="5-Point Star 2"/>
+          <p:cNvSpPr/>
+          <p:nvPr/>
+        </p:nvSpPr>
+        <p:spPr>
+          <a:xfrm>
+            <a:off x="457200" y="457200"/>
+            <a:ext cx="914400" cy="914400"/>
+          </a:xfrm>
+          <a:prstGeom prst="star5">
+            <a:avLst/>
+          </a:prstGeom>
+          <a:solidFill>
+            <a:srgbClr val="FFD200"/>
+          </a:solidFill>
+          <a:ln>
+            <a:noFill/>
+          </a:ln>
+        </p:spPr>
+        <p:style>
+          <a:lnRef idx="1">
+            <a:schemeClr val="accent1"/>
+          </a:lnRef>
+          <a:fillRef idx="3">
+            <a:schemeClr val="accent1"/>
+          </a:fillRef>
+          <a:effectRef idx="2">
+            <a:schemeClr val="accent1"/>
+          </a:effectRef>
+          <a:fontRef idx="minor">
+            <a:schemeClr val="lt1"/>
+          </a:fontRef>
+        </p:style>
+        <p:txBody>
+          <a:bodyPr rtlCol="0" anchor="ctr"/>
+          <a:lstStyle/>
+          <a:p>
+            <a:pPr algn="ctr"/>
+          </a:p>
+        </p:txBody>
+      </p:sp>
+      <p:sp>
+        <p:nvSpPr>
+          <p:cNvPr id="4" name="Rectangle 3"/>
+          <p:cNvSpPr/>
+          <p:nvPr/>
+        </p:nvSpPr>
+        <p:spPr>
+          <a:xfrm>
+            <a:off x="91440" y="91440"/>
+            <a:ext cx="8961120" cy="6675120"/>
+          </a:xfrm>
+          <a:prstGeom prst="rect">
+            <a:avLst/>
+          </a:prstGeom>
+          <a:noFill/>
+          <a:ln w="38100">
+            <a:solidFill>
+              <a:srgbClr val="FFD200"/>
+            </a:solidFill>
+          </a:ln>
+        </p:spPr>
+        <p:style>
+          <a:lnRef idx="1">
+            <a:schemeClr val="accent1"/>
+          </a:lnRef>
+          <a:fillRef idx="3">
+            <a:schemeClr val="accent1"/>
+          </a:fillRef>
+          <a:effectRef idx="2">
+            <a:schemeClr val="accent1"/>
+          </a:effectRef>
+          <a:fontRef idx="minor">
+            <a:schemeClr val="lt1"/>
+          </a:fontRef>
+        </p:style>
+        <p:txBody>
+          <a:bodyPr rtlCol="0" anchor="ctr"/>
+          <a:lstStyle/>
+          <a:p>
+            <a:pPr algn="ctr"/>
+          </a:p>
+        </p:txBody>
+      </p:sp>
+      <p:sp>
+        <p:nvSpPr>
+          <p:cNvPr id="5" name="TextBox 4"/>
           <p:cNvSpPr txBox="1"/>
           <p:nvPr/>
         </p:nvSpPr>
         <p:spPr>
           <a:xfrm>
-            <a:off x="731520" y="2011680"/>
-            <a:ext cx="10789920" cy="2286000"/>
+            <a:off x="914400" y="457200"/>
+            <a:ext cx="10515600" cy="1371600"/>
           </a:xfrm>
           <a:prstGeom prst="rect">
             <a:avLst/>
@@ -4396,7 +4783,7 @@
           <a:lstStyle/>
           <a:p>
             <a:pPr algn="ctr">
-              <a:defRPr sz="4800" b="1">
+              <a:defRPr sz="3600" b="1">
                 <a:solidFill>
                   <a:srgbClr val="FFFFFF"/>
                 </a:solidFill>
@@ -4406,16 +4793,75 @@
               <a:t>Tri ân — Đoàn kết — Khát vọng</a:t>
             </a:r>
           </a:p>
-          <a:p>
-            <a:pPr algn="ctr">
-              <a:defRPr sz="2400">
+        </p:txBody>
+      </p:sp>
+      <p:sp>
+        <p:nvSpPr>
+          <p:cNvPr id="6" name="TextBox 5"/>
+          <p:cNvSpPr txBox="1"/>
+          <p:nvPr/>
+        </p:nvSpPr>
+        <p:spPr>
+          <a:xfrm>
+            <a:off x="914400" y="2286000"/>
+            <a:ext cx="10515600" cy="3657600"/>
+          </a:xfrm>
+          <a:prstGeom prst="rect">
+            <a:avLst/>
+          </a:prstGeom>
+          <a:noFill/>
+        </p:spPr>
+        <p:txBody>
+          <a:bodyPr wrap="none">
+            <a:spAutoFit/>
+          </a:bodyPr>
+          <a:lstStyle/>
+          <a:p>
+            <a:pPr>
+              <a:defRPr sz="2400" b="1">
                 <a:solidFill>
                   <a:srgbClr val="FFFFFF"/>
                 </a:solidFill>
               </a:defRPr>
             </a:pPr>
             <a:r>
-              <a:t>Hướng tới tương lai phồn vinh, hạnh phúc</a:t>
+              <a:t>★ Việt Nam muôn năm!</a:t>
+            </a:r>
+          </a:p>
+          <a:p>
+            <a:pPr>
+              <a:defRPr sz="2400" b="1">
+                <a:solidFill>
+                  <a:srgbClr val="FFFFFF"/>
+                </a:solidFill>
+              </a:defRPr>
+            </a:pPr>
+            <a:r>
+              <a:t>★ Độc lập - Tự do - Hạnh phúc</a:t>
+            </a:r>
+          </a:p>
+          <a:p>
+            <a:pPr>
+              <a:defRPr sz="2400" b="1">
+                <a:solidFill>
+                  <a:srgbClr val="FFFFFF"/>
+                </a:solidFill>
+              </a:defRPr>
+            </a:pPr>
+            <a:r>
+              <a:t>★ Đoàn kết toàn dân tộc</a:t>
+            </a:r>
+          </a:p>
+          <a:p>
+            <a:pPr>
+              <a:defRPr sz="2400" b="1">
+                <a:solidFill>
+                  <a:srgbClr val="FFFFFF"/>
+                </a:solidFill>
+              </a:defRPr>
+            </a:pPr>
+            <a:r>
+              <a:t>★ Khát vọng Rồng bay</a:t>
             </a:r>
           </a:p>
         </p:txBody>
@@ -4453,7 +4899,7 @@
             <a:avLst/>
           </a:prstGeom>
           <a:solidFill>
-            <a:srgbClr val="F8F8F8"/>
+            <a:srgbClr val="F0F0F0"/>
           </a:solidFill>
           <a:ln>
             <a:noFill/>
@@ -4489,7 +4935,7 @@
         </p:nvSpPr>
         <p:spPr>
           <a:xfrm>
-            <a:off x="731520" y="365760"/>
+            <a:off x="731520" y="274320"/>
             <a:ext cx="10789920" cy="914400"/>
           </a:xfrm>
           <a:prstGeom prst="rect">
@@ -4504,14 +4950,14 @@
           <a:lstStyle/>
           <a:p>
             <a:pPr algn="ctr">
-              <a:defRPr sz="3600" b="1">
+              <a:defRPr sz="2800" b="1">
                 <a:solidFill>
                   <a:srgbClr val="E60000"/>
                 </a:solidFill>
               </a:defRPr>
             </a:pPr>
             <a:r>
-              <a:t>Mục tiêu</a:t>
+              <a:t>Từ Hy Sinh Đến Hòa Bình - 80 Năm Độc Lập</a:t>
             </a:r>
           </a:p>
         </p:txBody>
@@ -4524,8 +4970,8 @@
         </p:nvSpPr>
         <p:spPr>
           <a:xfrm>
-            <a:off x="731520" y="1280160"/>
-            <a:ext cx="10789920" cy="5303520"/>
+            <a:off x="457200" y="1371600"/>
+            <a:ext cx="5486400" cy="4572000"/>
           </a:xfrm>
           <a:prstGeom prst="rect">
             <a:avLst/>
@@ -4539,51 +4985,232 @@
           <a:lstStyle/>
           <a:p>
             <a:pPr>
-              <a:defRPr sz="2200">
-                <a:solidFill>
-                  <a:srgbClr val="141414"/>
-                </a:solidFill>
-              </a:defRPr>
-            </a:pPr>
-            <a:r>
-              <a:t>Tôn vinh truyền thống lịch sử vẻ vang của dân tộc Việt Nam</a:t>
+              <a:defRPr sz="1800" b="1">
+                <a:solidFill>
+                  <a:srgbClr val="FFFFFF"/>
+                </a:solidFill>
+              </a:defRPr>
+            </a:pPr>
+            <a:r>
+              <a:t>⚔️ THỜI KỲ HY SINH (1945-1975)</a:t>
             </a:r>
           </a:p>
           <a:p>
             <a:pPr>
-              <a:defRPr sz="2200">
-                <a:solidFill>
-                  <a:srgbClr val="141414"/>
-                </a:solidFill>
-              </a:defRPr>
-            </a:pPr>
-            <a:r>
-              <a:t>Giáo dục thế hệ trẻ về tinh thần yêu nước và cách mạng</a:t>
+              <a:defRPr sz="1400">
+                <a:solidFill>
+                  <a:srgbClr val="FFFFFF"/>
+                </a:solidFill>
+              </a:defRPr>
+            </a:pPr>
+            <a:r>
+              <a:t>• Cách mạng Tháng Tám 1945 - Đánh đuổi thực dân Pháp</a:t>
             </a:r>
           </a:p>
           <a:p>
             <a:pPr>
-              <a:defRPr sz="2200">
-                <a:solidFill>
-                  <a:srgbClr val="141414"/>
-                </a:solidFill>
-              </a:defRPr>
-            </a:pPr>
-            <a:r>
-              <a:t>Thúc đẩy tinh thần đoàn kết dân tộc và khát vọng phát triển</a:t>
+              <a:defRPr sz="1400">
+                <a:solidFill>
+                  <a:srgbClr val="FFFFFF"/>
+                </a:solidFill>
+              </a:defRPr>
+            </a:pPr>
+            <a:r>
+              <a:t>• Kháng chiến chống Mỹ cứu nước (1954-1975)</a:t>
             </a:r>
           </a:p>
           <a:p>
             <a:pPr>
-              <a:defRPr sz="2200">
-                <a:solidFill>
-                  <a:srgbClr val="141414"/>
-                </a:solidFill>
-              </a:defRPr>
-            </a:pPr>
-            <a:r>
-              <a:t>Khẳng định thành tựu của đất nước sau 80 năm độc lập</a:t>
-            </a:r>
+              <a:defRPr sz="1400">
+                <a:solidFill>
+                  <a:srgbClr val="FFFFFF"/>
+                </a:solidFill>
+              </a:defRPr>
+            </a:pPr>
+            <a:r>
+              <a:t>• Hy sinh của hàng triệu đồng bào vì độc lập tự do</a:t>
+            </a:r>
+          </a:p>
+          <a:p>
+            <a:pPr>
+              <a:defRPr sz="1400">
+                <a:solidFill>
+                  <a:srgbClr val="FFFFFF"/>
+                </a:solidFill>
+              </a:defRPr>
+            </a:pPr>
+            <a:r>
+              <a:t>• Tinh thần bất khuất của dân tộc Việt Nam</a:t>
+            </a:r>
+          </a:p>
+        </p:txBody>
+      </p:sp>
+      <p:sp>
+        <p:nvSpPr>
+          <p:cNvPr id="5" name="Rectangle 4"/>
+          <p:cNvSpPr/>
+          <p:nvPr/>
+        </p:nvSpPr>
+        <p:spPr>
+          <a:xfrm>
+            <a:off x="457200" y="1371600"/>
+            <a:ext cx="5486400" cy="4572000"/>
+          </a:xfrm>
+          <a:prstGeom prst="rect">
+            <a:avLst/>
+          </a:prstGeom>
+          <a:solidFill>
+            <a:srgbClr val="643232"/>
+          </a:solidFill>
+          <a:ln>
+            <a:noFill/>
+          </a:ln>
+        </p:spPr>
+        <p:style>
+          <a:lnRef idx="1">
+            <a:schemeClr val="accent1"/>
+          </a:lnRef>
+          <a:fillRef idx="3">
+            <a:schemeClr val="accent1"/>
+          </a:fillRef>
+          <a:effectRef idx="2">
+            <a:schemeClr val="accent1"/>
+          </a:effectRef>
+          <a:fontRef idx="minor">
+            <a:schemeClr val="lt1"/>
+          </a:fontRef>
+        </p:style>
+        <p:txBody>
+          <a:bodyPr rtlCol="0" anchor="ctr"/>
+          <a:lstStyle/>
+          <a:p>
+            <a:pPr algn="ctr"/>
+          </a:p>
+        </p:txBody>
+      </p:sp>
+      <p:sp>
+        <p:nvSpPr>
+          <p:cNvPr id="6" name="TextBox 5"/>
+          <p:cNvSpPr txBox="1"/>
+          <p:nvPr/>
+        </p:nvSpPr>
+        <p:spPr>
+          <a:xfrm>
+            <a:off x="6217920" y="1371600"/>
+            <a:ext cx="5486400" cy="4572000"/>
+          </a:xfrm>
+          <a:prstGeom prst="rect">
+            <a:avLst/>
+          </a:prstGeom>
+          <a:noFill/>
+        </p:spPr>
+        <p:txBody>
+          <a:bodyPr wrap="none">
+            <a:spAutoFit/>
+          </a:bodyPr>
+          <a:lstStyle/>
+          <a:p>
+            <a:pPr>
+              <a:defRPr sz="1800" b="1">
+                <a:solidFill>
+                  <a:srgbClr val="FFFFFF"/>
+                </a:solidFill>
+              </a:defRPr>
+            </a:pPr>
+            <a:r>
+              <a:t>🏛️ THỜI KỲ HÒA BÌNH (1975-2025)</a:t>
+            </a:r>
+          </a:p>
+          <a:p>
+            <a:pPr>
+              <a:defRPr sz="1400">
+                <a:solidFill>
+                  <a:srgbClr val="FFFFFF"/>
+                </a:solidFill>
+              </a:defRPr>
+            </a:pPr>
+            <a:r>
+              <a:t>• Hòa bình, thống nhất đất nước từ 1975</a:t>
+            </a:r>
+          </a:p>
+          <a:p>
+            <a:pPr>
+              <a:defRPr sz="1400">
+                <a:solidFill>
+                  <a:srgbClr val="FFFFFF"/>
+                </a:solidFill>
+              </a:defRPr>
+            </a:pPr>
+            <a:r>
+              <a:t>• Đổi mới và phát triển kinh tế từ 1986</a:t>
+            </a:r>
+          </a:p>
+          <a:p>
+            <a:pPr>
+              <a:defRPr sz="1400">
+                <a:solidFill>
+                  <a:srgbClr val="FFFFFF"/>
+                </a:solidFill>
+              </a:defRPr>
+            </a:pPr>
+            <a:r>
+              <a:t>• Hội nhập quốc tế và phát triển bền vững</a:t>
+            </a:r>
+          </a:p>
+          <a:p>
+            <a:pPr>
+              <a:defRPr sz="1400">
+                <a:solidFill>
+                  <a:srgbClr val="FFFFFF"/>
+                </a:solidFill>
+              </a:defRPr>
+            </a:pPr>
+            <a:r>
+              <a:t>• Khát vọng trở thành nước phát triển vào 2045</a:t>
+            </a:r>
+          </a:p>
+        </p:txBody>
+      </p:sp>
+      <p:sp>
+        <p:nvSpPr>
+          <p:cNvPr id="7" name="Rectangle 6"/>
+          <p:cNvSpPr/>
+          <p:nvPr/>
+        </p:nvSpPr>
+        <p:spPr>
+          <a:xfrm>
+            <a:off x="6217920" y="1371600"/>
+            <a:ext cx="5486400" cy="4572000"/>
+          </a:xfrm>
+          <a:prstGeom prst="rect">
+            <a:avLst/>
+          </a:prstGeom>
+          <a:solidFill>
+            <a:srgbClr val="326432"/>
+          </a:solidFill>
+          <a:ln>
+            <a:noFill/>
+          </a:ln>
+        </p:spPr>
+        <p:style>
+          <a:lnRef idx="1">
+            <a:schemeClr val="accent1"/>
+          </a:lnRef>
+          <a:fillRef idx="3">
+            <a:schemeClr val="accent1"/>
+          </a:fillRef>
+          <a:effectRef idx="2">
+            <a:schemeClr val="accent1"/>
+          </a:effectRef>
+          <a:fontRef idx="minor">
+            <a:schemeClr val="lt1"/>
+          </a:fontRef>
+        </p:style>
+        <p:txBody>
+          <a:bodyPr rtlCol="0" anchor="ctr"/>
+          <a:lstStyle/>
+          <a:p>
+            <a:pPr algn="ctr"/>
           </a:p>
         </p:txBody>
       </p:sp>
@@ -4622,9 +5249,6 @@
           <a:solidFill>
             <a:srgbClr val="F8F8F8"/>
           </a:solidFill>
-          <a:ln>
-            <a:noFill/>
-          </a:ln>
         </p:spPr>
         <p:style>
           <a:lnRef idx="1">
@@ -4650,14 +5274,100 @@
       </p:sp>
       <p:sp>
         <p:nvSpPr>
-          <p:cNvPr id="3" name="TextBox 2"/>
+          <p:cNvPr id="3" name="5-Point Star 2"/>
+          <p:cNvSpPr/>
+          <p:nvPr/>
+        </p:nvSpPr>
+        <p:spPr>
+          <a:xfrm>
+            <a:off x="457200" y="457200"/>
+            <a:ext cx="914400" cy="914400"/>
+          </a:xfrm>
+          <a:prstGeom prst="star5">
+            <a:avLst/>
+          </a:prstGeom>
+          <a:solidFill>
+            <a:srgbClr val="FFD200"/>
+          </a:solidFill>
+          <a:ln>
+            <a:noFill/>
+          </a:ln>
+        </p:spPr>
+        <p:style>
+          <a:lnRef idx="1">
+            <a:schemeClr val="accent1"/>
+          </a:lnRef>
+          <a:fillRef idx="3">
+            <a:schemeClr val="accent1"/>
+          </a:fillRef>
+          <a:effectRef idx="2">
+            <a:schemeClr val="accent1"/>
+          </a:effectRef>
+          <a:fontRef idx="minor">
+            <a:schemeClr val="lt1"/>
+          </a:fontRef>
+        </p:style>
+        <p:txBody>
+          <a:bodyPr rtlCol="0" anchor="ctr"/>
+          <a:lstStyle/>
+          <a:p>
+            <a:pPr algn="ctr"/>
+          </a:p>
+        </p:txBody>
+      </p:sp>
+      <p:sp>
+        <p:nvSpPr>
+          <p:cNvPr id="4" name="Rectangle 3"/>
+          <p:cNvSpPr/>
+          <p:nvPr/>
+        </p:nvSpPr>
+        <p:spPr>
+          <a:xfrm>
+            <a:off x="91440" y="91440"/>
+            <a:ext cx="8961120" cy="6675120"/>
+          </a:xfrm>
+          <a:prstGeom prst="rect">
+            <a:avLst/>
+          </a:prstGeom>
+          <a:noFill/>
+          <a:ln w="38100">
+            <a:solidFill>
+              <a:srgbClr val="FFD200"/>
+            </a:solidFill>
+          </a:ln>
+        </p:spPr>
+        <p:style>
+          <a:lnRef idx="1">
+            <a:schemeClr val="accent1"/>
+          </a:lnRef>
+          <a:fillRef idx="3">
+            <a:schemeClr val="accent1"/>
+          </a:fillRef>
+          <a:effectRef idx="2">
+            <a:schemeClr val="accent1"/>
+          </a:effectRef>
+          <a:fontRef idx="minor">
+            <a:schemeClr val="lt1"/>
+          </a:fontRef>
+        </p:style>
+        <p:txBody>
+          <a:bodyPr rtlCol="0" anchor="ctr"/>
+          <a:lstStyle/>
+          <a:p>
+            <a:pPr algn="ctr"/>
+          </a:p>
+        </p:txBody>
+      </p:sp>
+      <p:sp>
+        <p:nvSpPr>
+          <p:cNvPr id="5" name="TextBox 4"/>
           <p:cNvSpPr txBox="1"/>
           <p:nvPr/>
         </p:nvSpPr>
         <p:spPr>
           <a:xfrm>
             <a:off x="731520" y="365760"/>
-            <a:ext cx="10789920" cy="914400"/>
+            <a:ext cx="10789920" cy="1097280"/>
           </a:xfrm>
           <a:prstGeom prst="rect">
             <a:avLst/>
@@ -4671,28 +5381,28 @@
           <a:lstStyle/>
           <a:p>
             <a:pPr algn="ctr">
-              <a:defRPr sz="3600" b="1">
+              <a:defRPr sz="3200" b="1">
                 <a:solidFill>
                   <a:srgbClr val="E60000"/>
                 </a:solidFill>
               </a:defRPr>
             </a:pPr>
             <a:r>
-              <a:t>Phạm vi</a:t>
-            </a:r>
-          </a:p>
-        </p:txBody>
-      </p:sp>
-      <p:sp>
-        <p:nvSpPr>
-          <p:cNvPr id="4" name="TextBox 3"/>
+              <a:t>Mục tiêu Cao Cả</a:t>
+            </a:r>
+          </a:p>
+        </p:txBody>
+      </p:sp>
+      <p:sp>
+        <p:nvSpPr>
+          <p:cNvPr id="6" name="TextBox 5"/>
           <p:cNvSpPr txBox="1"/>
           <p:nvPr/>
         </p:nvSpPr>
         <p:spPr>
           <a:xfrm>
-            <a:off x="731520" y="1280160"/>
-            <a:ext cx="10789920" cy="5303520"/>
+            <a:off x="731520" y="1645920"/>
+            <a:ext cx="10789920" cy="4572000"/>
           </a:xfrm>
           <a:prstGeom prst="rect">
             <a:avLst/>
@@ -4706,50 +5416,62 @@
           <a:lstStyle/>
           <a:p>
             <a:pPr>
-              <a:defRPr sz="2200">
+              <a:defRPr sz="2000" b="1">
                 <a:solidFill>
                   <a:srgbClr val="141414"/>
                 </a:solidFill>
               </a:defRPr>
             </a:pPr>
             <a:r>
-              <a:t>Phạm vi địa lý: Toàn quốc với trọng tâm tại Hà Nội</a:t>
+              <a:t>🏛️ Tôn vinh giá trị lịch sử vĩ đại của Cách mạng Tháng Tám và Tuyên ngôn Độc lập 2/9/1945</a:t>
             </a:r>
           </a:p>
           <a:p>
             <a:pPr>
-              <a:defRPr sz="2200">
+              <a:defRPr sz="2000" b="1">
                 <a:solidFill>
                   <a:srgbClr val="141414"/>
                 </a:solidFill>
               </a:defRPr>
             </a:pPr>
             <a:r>
-              <a:t>Đối tượng tham gia: Công dân Việt Nam và kiều bào</a:t>
+              <a:t>🏛️ Khẳng định thành tựu 80 năm xây dựng và bảo vệ Tổ quốc từ ngày độc lập đầu tiên</a:t>
             </a:r>
           </a:p>
           <a:p>
             <a:pPr>
-              <a:defRPr sz="2200">
+              <a:defRPr sz="2000" b="1">
                 <a:solidFill>
                   <a:srgbClr val="141414"/>
                 </a:solidFill>
               </a:defRPr>
             </a:pPr>
             <a:r>
-              <a:t>Thời gian: 90 ngày (T-60 đến T+30) xoay quanh ngày 2/9/2025</a:t>
+              <a:t>🏛️ Giáo dục truyền thống yêu nước, lòng tự hào dân tộc và ý chí tự lực, tự cường cho các tầng lớp nhân dân</a:t>
             </a:r>
           </a:p>
           <a:p>
             <a:pPr>
-              <a:defRPr sz="2200">
+              <a:defRPr sz="2000" b="1">
                 <a:solidFill>
                   <a:srgbClr val="141414"/>
                 </a:solidFill>
               </a:defRPr>
             </a:pPr>
             <a:r>
-              <a:t>Nội dung: Lễ kỷ niệm, triển lãm, hội thảo, hoạt động văn hóa</a:t>
+              <a:t>🏛️ Củng cố và tăng cường sức mạnh khối đại đoàn kết toàn dân tộc trong thời đại mới</a:t>
+            </a:r>
+          </a:p>
+          <a:p>
+            <a:pPr>
+              <a:defRPr sz="2000" b="1">
+                <a:solidFill>
+                  <a:srgbClr val="141414"/>
+                </a:solidFill>
+              </a:defRPr>
+            </a:pPr>
+            <a:r>
+              <a:t>🏛️ Quảng bá hình ảnh đất nước, con người Việt Nam hòa bình, hữu nghị, năng động và phát triển</a:t>
             </a:r>
           </a:p>
         </p:txBody>
@@ -4845,7 +5567,7 @@
               </a:defRPr>
             </a:pPr>
             <a:r>
-              <a:t>Các bên liên quan</a:t>
+              <a:t>Phạm vi</a:t>
             </a:r>
           </a:p>
         </p:txBody>
@@ -4859,7 +5581,7 @@
         <p:spPr>
           <a:xfrm>
             <a:off x="731520" y="1280160"/>
-            <a:ext cx="5120640" cy="5120640"/>
+            <a:ext cx="10789920" cy="5303520"/>
           </a:xfrm>
           <a:prstGeom prst="rect">
             <a:avLst/>
@@ -4873,109 +5595,50 @@
           <a:lstStyle/>
           <a:p>
             <a:pPr>
-              <a:defRPr sz="2000">
+              <a:defRPr sz="2200">
                 <a:solidFill>
                   <a:srgbClr val="141414"/>
                 </a:solidFill>
               </a:defRPr>
             </a:pPr>
             <a:r>
-              <a:t>Ban Chấp hành Trung ương Đảng Cộng sản Việt Nam</a:t>
+              <a:t>Phạm vi địa lý: Toàn quốc, với các hoạt động trọng điểm tại Thủ đô Hà Nội - nơi Chủ tịch Hồ Chí Minh đọc Tuyên ngôn Độc lập</a:t>
             </a:r>
           </a:p>
           <a:p>
             <a:pPr>
-              <a:defRPr sz="2000">
+              <a:defRPr sz="2200">
                 <a:solidFill>
                   <a:srgbClr val="141414"/>
                 </a:solidFill>
               </a:defRPr>
             </a:pPr>
             <a:r>
-              <a:t>Chính phủ và các bộ, ngành liên quan</a:t>
+              <a:t>Đối tượng tham gia: Toàn thể nhân dân Việt Nam, kiều bào ta ở nước ngoài, và bạn bè quốc tế</a:t>
             </a:r>
           </a:p>
           <a:p>
             <a:pPr>
-              <a:defRPr sz="2000">
+              <a:defRPr sz="2200">
                 <a:solidFill>
                   <a:srgbClr val="141414"/>
                 </a:solidFill>
               </a:defRPr>
             </a:pPr>
             <a:r>
-              <a:t>Ủy ban Trung ương Mặt trận Tổ quốc Việt Nam</a:t>
+              <a:t>Thời gian: 90 ngày, từ T-60 đến T+30 (so với ngày 2/9/2025) - kỷ niệm 80 năm ngày độc lập</a:t>
             </a:r>
           </a:p>
           <a:p>
             <a:pPr>
-              <a:defRPr sz="2000">
+              <a:defRPr sz="2200">
                 <a:solidFill>
                   <a:srgbClr val="141414"/>
                 </a:solidFill>
               </a:defRPr>
             </a:pPr>
             <a:r>
-              <a:t>Các tổ chức chính trị - xã hội</a:t>
-            </a:r>
-          </a:p>
-        </p:txBody>
-      </p:sp>
-      <p:sp>
-        <p:nvSpPr>
-          <p:cNvPr id="5" name="TextBox 4"/>
-          <p:cNvSpPr txBox="1"/>
-          <p:nvPr/>
-        </p:nvSpPr>
-        <p:spPr>
-          <a:xfrm>
-            <a:off x="6035040" y="1280160"/>
-            <a:ext cx="5120640" cy="5120640"/>
-          </a:xfrm>
-          <a:prstGeom prst="rect">
-            <a:avLst/>
-          </a:prstGeom>
-          <a:noFill/>
-        </p:spPr>
-        <p:txBody>
-          <a:bodyPr wrap="none">
-            <a:spAutoFit/>
-          </a:bodyPr>
-          <a:lstStyle/>
-          <a:p>
-            <a:pPr>
-              <a:defRPr sz="2000">
-                <a:solidFill>
-                  <a:srgbClr val="141414"/>
-                </a:solidFill>
-              </a:defRPr>
-            </a:pPr>
-            <a:r>
-              <a:t>Chính quyền địa phương các cấp</a:t>
-            </a:r>
-          </a:p>
-          <a:p>
-            <a:pPr>
-              <a:defRPr sz="2000">
-                <a:solidFill>
-                  <a:srgbClr val="141414"/>
-                </a:solidFill>
-              </a:defRPr>
-            </a:pPr>
-            <a:r>
-              <a:t>Các cơ quan truyền thông báo chí</a:t>
-            </a:r>
-          </a:p>
-          <a:p>
-            <a:pPr>
-              <a:defRPr sz="2000">
-                <a:solidFill>
-                  <a:srgbClr val="141414"/>
-                </a:solidFill>
-              </a:defRPr>
-            </a:pPr>
-            <a:r>
-              <a:t>Nhân dân và kiều bào Việt Nam</a:t>
+              <a:t>Nội dung: Chuỗi hoạt động bao gồm Lễ míttinh, diễu binh, diễu hành cấp quốc gia và các hoạt động văn hóa lịch sử</a:t>
             </a:r>
           </a:p>
         </p:txBody>
@@ -5071,7 +5734,7 @@
               </a:defRPr>
             </a:pPr>
             <a:r>
-              <a:t>Dòng thời gian (A90)</a:t>
+              <a:t>Các bên liên quan</a:t>
             </a:r>
           </a:p>
         </p:txBody>
@@ -5084,8 +5747,8 @@
         </p:nvSpPr>
         <p:spPr>
           <a:xfrm>
-            <a:off x="731520" y="1645920"/>
-            <a:ext cx="10789920" cy="914400"/>
+            <a:off x="731520" y="1280160"/>
+            <a:ext cx="5120640" cy="5120640"/>
           </a:xfrm>
           <a:prstGeom prst="rect">
             <a:avLst/>
@@ -5099,74 +5762,50 @@
           <a:lstStyle/>
           <a:p>
             <a:pPr>
-              <a:defRPr sz="2400" b="1">
-                <a:solidFill>
-                  <a:srgbClr val="E60000"/>
-                </a:solidFill>
-              </a:defRPr>
-            </a:pPr>
-            <a:r>
-              <a:t>Giai đoạn Chuẩn bị — T-60 đến T-30</a:t>
-            </a:r>
-          </a:p>
-          <a:p>
-            <a:pPr lvl="1">
-              <a:defRPr sz="1800">
+              <a:defRPr sz="2000">
                 <a:solidFill>
                   <a:srgbClr val="141414"/>
                 </a:solidFill>
               </a:defRPr>
             </a:pPr>
             <a:r>
-              <a:t>  • Thành lập Ban chỉ đạo cấp Trung ương</a:t>
-            </a:r>
-          </a:p>
-          <a:p>
-            <a:pPr lvl="1">
-              <a:defRPr sz="1800">
+              <a:t>Ban Chấp hành Trung ương Đảng, Quốc hội, Chủ tịch nước, Chính phủ</a:t>
+            </a:r>
+          </a:p>
+          <a:p>
+            <a:pPr>
+              <a:defRPr sz="2000">
                 <a:solidFill>
                   <a:srgbClr val="141414"/>
                 </a:solidFill>
               </a:defRPr>
             </a:pPr>
             <a:r>
-              <a:t>  • Xây dựng kế hoạch chi tiết và phân công nhiệm vụ</a:t>
-            </a:r>
-          </a:p>
-          <a:p>
-            <a:pPr lvl="1">
-              <a:defRPr sz="1800">
+              <a:t>Các Bộ, ban, ngành Trung ương (Bộ Quốc phòng, Bộ Công an, Bộ Văn hóa)</a:t>
+            </a:r>
+          </a:p>
+          <a:p>
+            <a:pPr>
+              <a:defRPr sz="2000">
                 <a:solidFill>
                   <a:srgbClr val="141414"/>
                 </a:solidFill>
               </a:defRPr>
             </a:pPr>
             <a:r>
-              <a:t>  • Phân bổ ngân sách và huy động nguồn lực</a:t>
-            </a:r>
-          </a:p>
-          <a:p>
-            <a:pPr lvl="1">
-              <a:defRPr sz="1800">
+              <a:t>Ủy ban Trung ương Mặt trận Tổ quốc Việt Nam và các tổ chức thành viên</a:t>
+            </a:r>
+          </a:p>
+          <a:p>
+            <a:pPr>
+              <a:defRPr sz="2000">
                 <a:solidFill>
                   <a:srgbClr val="141414"/>
                 </a:solidFill>
               </a:defRPr>
             </a:pPr>
             <a:r>
-              <a:t>  • Tuyển chọn và chuẩn bị địa điểm tổ chức</a:t>
-            </a:r>
-          </a:p>
-          <a:p>
-            <a:pPr lvl="1">
-              <a:defRPr sz="1800">
-                <a:solidFill>
-                  <a:srgbClr val="141414"/>
-                </a:solidFill>
-              </a:defRPr>
-            </a:pPr>
-            <a:r>
-              <a:t>  • Tập huấn lực lượng tham gia</a:t>
+              <a:t>Ủy ban nhân dân các tỉnh, thành phố trực thuộc Trung ương</a:t>
             </a:r>
           </a:p>
         </p:txBody>
@@ -5179,8 +5818,8 @@
         </p:nvSpPr>
         <p:spPr>
           <a:xfrm>
-            <a:off x="731520" y="2743200"/>
-            <a:ext cx="10789920" cy="914400"/>
+            <a:off x="6035040" y="1280160"/>
+            <a:ext cx="5120640" cy="5120640"/>
           </a:xfrm>
           <a:prstGeom prst="rect">
             <a:avLst/>
@@ -5194,264 +5833,26 @@
           <a:lstStyle/>
           <a:p>
             <a:pPr>
-              <a:defRPr sz="2400" b="1">
-                <a:solidFill>
-                  <a:srgbClr val="E60000"/>
-                </a:solidFill>
-              </a:defRPr>
-            </a:pPr>
-            <a:r>
-              <a:t>Giai đoạn Triển khai — T-30 đến T-7</a:t>
-            </a:r>
-          </a:p>
-          <a:p>
-            <a:pPr lvl="1">
-              <a:defRPr sz="1800">
+              <a:defRPr sz="2000">
                 <a:solidFill>
                   <a:srgbClr val="141414"/>
                 </a:solidFill>
               </a:defRPr>
             </a:pPr>
             <a:r>
-              <a:t>  • Tổ chức các hoạt động tuyên truyền rộng rãi</a:t>
-            </a:r>
-          </a:p>
-          <a:p>
-            <a:pPr lvl="1">
-              <a:defRPr sz="1800">
+              <a:t>Các cơ quan thông tấn, báo chí</a:t>
+            </a:r>
+          </a:p>
+          <a:p>
+            <a:pPr>
+              <a:defRPr sz="2000">
                 <a:solidFill>
                   <a:srgbClr val="141414"/>
                 </a:solidFill>
               </a:defRPr>
             </a:pPr>
             <a:r>
-              <a:t>  • Chuẩn bị hậu cần và trang thiết bị</a:t>
-            </a:r>
-          </a:p>
-          <a:p>
-            <a:pPr lvl="1">
-              <a:defRPr sz="1800">
-                <a:solidFill>
-                  <a:srgbClr val="141414"/>
-                </a:solidFill>
-              </a:defRPr>
-            </a:pPr>
-            <a:r>
-              <a:t>  • Tập huấn và diễn tập các nghi lễ</a:t>
-            </a:r>
-          </a:p>
-          <a:p>
-            <a:pPr lvl="1">
-              <a:defRPr sz="1800">
-                <a:solidFill>
-                  <a:srgbClr val="141414"/>
-                </a:solidFill>
-              </a:defRPr>
-            </a:pPr>
-            <a:r>
-              <a:t>  • Kiểm tra an ninh và an toàn</a:t>
-            </a:r>
-          </a:p>
-          <a:p>
-            <a:pPr lvl="1">
-              <a:defRPr sz="1800">
-                <a:solidFill>
-                  <a:srgbClr val="141414"/>
-                </a:solidFill>
-              </a:defRPr>
-            </a:pPr>
-            <a:r>
-              <a:t>  • Phối hợp với các địa phương</a:t>
-            </a:r>
-          </a:p>
-        </p:txBody>
-      </p:sp>
-      <p:sp>
-        <p:nvSpPr>
-          <p:cNvPr id="6" name="TextBox 5"/>
-          <p:cNvSpPr txBox="1"/>
-          <p:nvPr/>
-        </p:nvSpPr>
-        <p:spPr>
-          <a:xfrm>
-            <a:off x="731520" y="3840480"/>
-            <a:ext cx="10789920" cy="914400"/>
-          </a:xfrm>
-          <a:prstGeom prst="rect">
-            <a:avLst/>
-          </a:prstGeom>
-          <a:noFill/>
-        </p:spPr>
-        <p:txBody>
-          <a:bodyPr wrap="none">
-            <a:spAutoFit/>
-          </a:bodyPr>
-          <a:lstStyle/>
-          <a:p>
-            <a:pPr>
-              <a:defRPr sz="2400" b="1">
-                <a:solidFill>
-                  <a:srgbClr val="E60000"/>
-                </a:solidFill>
-              </a:defRPr>
-            </a:pPr>
-            <a:r>
-              <a:t>Giai đoạn Thực hiện — T-7 đến T+1</a:t>
-            </a:r>
-          </a:p>
-          <a:p>
-            <a:pPr lvl="1">
-              <a:defRPr sz="1800">
-                <a:solidFill>
-                  <a:srgbClr val="141414"/>
-                </a:solidFill>
-              </a:defRPr>
-            </a:pPr>
-            <a:r>
-              <a:t>  • Tổ chức lễ kỷ niệm chính thức</a:t>
-            </a:r>
-          </a:p>
-          <a:p>
-            <a:pPr lvl="1">
-              <a:defRPr sz="1800">
-                <a:solidFill>
-                  <a:srgbClr val="141414"/>
-                </a:solidFill>
-              </a:defRPr>
-            </a:pPr>
-            <a:r>
-              <a:t>  • Các hoạt động văn hóa nghệ thuật</a:t>
-            </a:r>
-          </a:p>
-          <a:p>
-            <a:pPr lvl="1">
-              <a:defRPr sz="1800">
-                <a:solidFill>
-                  <a:srgbClr val="141414"/>
-                </a:solidFill>
-              </a:defRPr>
-            </a:pPr>
-            <a:r>
-              <a:t>  • Truyền hình trực tiếp toàn quốc</a:t>
-            </a:r>
-          </a:p>
-          <a:p>
-            <a:pPr lvl="1">
-              <a:defRPr sz="1800">
-                <a:solidFill>
-                  <a:srgbClr val="141414"/>
-                </a:solidFill>
-              </a:defRPr>
-            </a:pPr>
-            <a:r>
-              <a:t>  • Đảm bảo an ninh trật tự tuyệt đối</a:t>
-            </a:r>
-          </a:p>
-          <a:p>
-            <a:pPr lvl="1">
-              <a:defRPr sz="1800">
-                <a:solidFill>
-                  <a:srgbClr val="141414"/>
-                </a:solidFill>
-              </a:defRPr>
-            </a:pPr>
-            <a:r>
-              <a:t>  • Ghi nhận và tôn vinh các cá nhân, tập thể</a:t>
-            </a:r>
-          </a:p>
-        </p:txBody>
-      </p:sp>
-      <p:sp>
-        <p:nvSpPr>
-          <p:cNvPr id="7" name="TextBox 6"/>
-          <p:cNvSpPr txBox="1"/>
-          <p:nvPr/>
-        </p:nvSpPr>
-        <p:spPr>
-          <a:xfrm>
-            <a:off x="731520" y="4937760"/>
-            <a:ext cx="10789920" cy="914400"/>
-          </a:xfrm>
-          <a:prstGeom prst="rect">
-            <a:avLst/>
-          </a:prstGeom>
-          <a:noFill/>
-        </p:spPr>
-        <p:txBody>
-          <a:bodyPr wrap="none">
-            <a:spAutoFit/>
-          </a:bodyPr>
-          <a:lstStyle/>
-          <a:p>
-            <a:pPr>
-              <a:defRPr sz="2400" b="1">
-                <a:solidFill>
-                  <a:srgbClr val="E60000"/>
-                </a:solidFill>
-              </a:defRPr>
-            </a:pPr>
-            <a:r>
-              <a:t>Giai đoạn Kết thúc — T+1 đến T+30</a:t>
-            </a:r>
-          </a:p>
-          <a:p>
-            <a:pPr lvl="1">
-              <a:defRPr sz="1800">
-                <a:solidFill>
-                  <a:srgbClr val="141414"/>
-                </a:solidFill>
-              </a:defRPr>
-            </a:pPr>
-            <a:r>
-              <a:t>  • Tổng kết và đánh giá kết quả</a:t>
-            </a:r>
-          </a:p>
-          <a:p>
-            <a:pPr lvl="1">
-              <a:defRPr sz="1800">
-                <a:solidFill>
-                  <a:srgbClr val="141414"/>
-                </a:solidFill>
-              </a:defRPr>
-            </a:pPr>
-            <a:r>
-              <a:t>  • Báo cáo tổng hợp lên cấp trên</a:t>
-            </a:r>
-          </a:p>
-          <a:p>
-            <a:pPr lvl="1">
-              <a:defRPr sz="1800">
-                <a:solidFill>
-                  <a:srgbClr val="141414"/>
-                </a:solidFill>
-              </a:defRPr>
-            </a:pPr>
-            <a:r>
-              <a:t>  • Lưu trữ tài liệu và hiện vật</a:t>
-            </a:r>
-          </a:p>
-          <a:p>
-            <a:pPr lvl="1">
-              <a:defRPr sz="1800">
-                <a:solidFill>
-                  <a:srgbClr val="141414"/>
-                </a:solidFill>
-              </a:defRPr>
-            </a:pPr>
-            <a:r>
-              <a:t>  • Tri ân các đơn vị tham gia</a:t>
-            </a:r>
-          </a:p>
-          <a:p>
-            <a:pPr lvl="1">
-              <a:defRPr sz="1800">
-                <a:solidFill>
-                  <a:srgbClr val="141414"/>
-                </a:solidFill>
-              </a:defRPr>
-            </a:pPr>
-            <a:r>
-              <a:t>  • Rút kinh nghiệm cho các sự kiện tương lai</a:t>
+              <a:t>Toàn thể nhân dân Việt Nam và cộng đồng người Việt Nam ở nước ngoài</a:t>
             </a:r>
           </a:p>
         </p:txBody>
@@ -5547,7 +5948,7 @@
               </a:defRPr>
             </a:pPr>
             <a:r>
-              <a:t>Chương trình trọng điểm</a:t>
+              <a:t>Dòng thời gian (A90)</a:t>
             </a:r>
           </a:p>
         </p:txBody>
@@ -5560,8 +5961,8 @@
         </p:nvSpPr>
         <p:spPr>
           <a:xfrm>
-            <a:off x="731520" y="1280160"/>
-            <a:ext cx="10789920" cy="5303520"/>
+            <a:off x="731520" y="1645920"/>
+            <a:ext cx="10789920" cy="914400"/>
           </a:xfrm>
           <a:prstGeom prst="rect">
             <a:avLst/>
@@ -5575,50 +5976,311 @@
           <a:lstStyle/>
           <a:p>
             <a:pPr>
-              <a:defRPr sz="2200">
+              <a:defRPr sz="2400" b="1">
+                <a:solidFill>
+                  <a:srgbClr val="E60000"/>
+                </a:solidFill>
+              </a:defRPr>
+            </a:pPr>
+            <a:r>
+              <a:t>Giai đoạn 1: Khởi động và Chuẩn bị — T-60 đến T-30</a:t>
+            </a:r>
+          </a:p>
+          <a:p>
+            <a:pPr lvl="1">
+              <a:defRPr sz="1800">
                 <a:solidFill>
                   <a:srgbClr val="141414"/>
                 </a:solidFill>
               </a:defRPr>
             </a:pPr>
             <a:r>
-              <a:t>Lễ kỷ niệm chính thức: Tôn vinh 80 năm Quốc khánh với nghi lễ trang trọng (Chủ trì: Ban Tổ chức Trung ương)</a:t>
-            </a:r>
-          </a:p>
+              <a:t>  • Thành lập Ban Chỉ đạo, Ban Tổ chức và các Tiểu ban chuyên trách</a:t>
+            </a:r>
+          </a:p>
+          <a:p>
+            <a:pPr lvl="1">
+              <a:defRPr sz="1800">
+                <a:solidFill>
+                  <a:srgbClr val="141414"/>
+                </a:solidFill>
+              </a:defRPr>
+            </a:pPr>
+            <a:r>
+              <a:t>  • Xây dựng và phê duyệt Kế hoạch tổng thể, kịch bản chi tiết</a:t>
+            </a:r>
+          </a:p>
+          <a:p>
+            <a:pPr lvl="1">
+              <a:defRPr sz="1800">
+                <a:solidFill>
+                  <a:srgbClr val="141414"/>
+                </a:solidFill>
+              </a:defRPr>
+            </a:pPr>
+            <a:r>
+              <a:t>  • Dự toán, phân bổ và triển khai các thủ tục về ngân sách</a:t>
+            </a:r>
+          </a:p>
+          <a:p>
+            <a:pPr lvl="1">
+              <a:defRPr sz="1800">
+                <a:solidFill>
+                  <a:srgbClr val="141414"/>
+                </a:solidFill>
+              </a:defRPr>
+            </a:pPr>
+            <a:r>
+              <a:t>  • Phát động các phong trào thi đua yêu nước chào mừng kỷ niệm</a:t>
+            </a:r>
+          </a:p>
+        </p:txBody>
+      </p:sp>
+      <p:sp>
+        <p:nvSpPr>
+          <p:cNvPr id="5" name="TextBox 4"/>
+          <p:cNvSpPr txBox="1"/>
+          <p:nvPr/>
+        </p:nvSpPr>
+        <p:spPr>
+          <a:xfrm>
+            <a:off x="731520" y="2743200"/>
+            <a:ext cx="10789920" cy="914400"/>
+          </a:xfrm>
+          <a:prstGeom prst="rect">
+            <a:avLst/>
+          </a:prstGeom>
+          <a:noFill/>
+        </p:spPr>
+        <p:txBody>
+          <a:bodyPr wrap="none">
+            <a:spAutoFit/>
+          </a:bodyPr>
+          <a:lstStyle/>
           <a:p>
             <a:pPr>
-              <a:defRPr sz="2200">
+              <a:defRPr sz="2400" b="1">
+                <a:solidFill>
+                  <a:srgbClr val="E60000"/>
+                </a:solidFill>
+              </a:defRPr>
+            </a:pPr>
+            <a:r>
+              <a:t>Giai đoạn 2: Triển khai cao điểm — T-30 đến T-7</a:t>
+            </a:r>
+          </a:p>
+          <a:p>
+            <a:pPr lvl="1">
+              <a:defRPr sz="1800">
                 <a:solidFill>
                   <a:srgbClr val="141414"/>
                 </a:solidFill>
               </a:defRPr>
             </a:pPr>
             <a:r>
-              <a:t>Triển lãm lịch sử: Giáo dục truyền thống cách mạng cho thế hệ trẻ (Chủ trì: Bảo tàng Lịch sử Quốc gia)</a:t>
-            </a:r>
-          </a:p>
+              <a:t>  • Đẩy mạnh công tác tuyên truyền trên các phương tiện thông tin đại chúng</a:t>
+            </a:r>
+          </a:p>
+          <a:p>
+            <a:pPr lvl="1">
+              <a:defRPr sz="1800">
+                <a:solidFill>
+                  <a:srgbClr val="141414"/>
+                </a:solidFill>
+              </a:defRPr>
+            </a:pPr>
+            <a:r>
+              <a:t>  • Tổ chức sơ duyệt, tổng duyệt các chương trình chính</a:t>
+            </a:r>
+          </a:p>
+          <a:p>
+            <a:pPr lvl="1">
+              <a:defRPr sz="1800">
+                <a:solidFill>
+                  <a:srgbClr val="141414"/>
+                </a:solidFill>
+              </a:defRPr>
+            </a:pPr>
+            <a:r>
+              <a:t>  • Hoàn thiện công tác hậu cần, kỹ thuật, an ninh, y tế</a:t>
+            </a:r>
+          </a:p>
+          <a:p>
+            <a:pPr lvl="1">
+              <a:defRPr sz="1800">
+                <a:solidFill>
+                  <a:srgbClr val="141414"/>
+                </a:solidFill>
+              </a:defRPr>
+            </a:pPr>
+            <a:r>
+              <a:t>  • Tổ chức các hoạt động bên lề tại các địa phương trên cả nước</a:t>
+            </a:r>
+          </a:p>
+        </p:txBody>
+      </p:sp>
+      <p:sp>
+        <p:nvSpPr>
+          <p:cNvPr id="6" name="TextBox 5"/>
+          <p:cNvSpPr txBox="1"/>
+          <p:nvPr/>
+        </p:nvSpPr>
+        <p:spPr>
+          <a:xfrm>
+            <a:off x="731520" y="3840480"/>
+            <a:ext cx="10789920" cy="914400"/>
+          </a:xfrm>
+          <a:prstGeom prst="rect">
+            <a:avLst/>
+          </a:prstGeom>
+          <a:noFill/>
+        </p:spPr>
+        <p:txBody>
+          <a:bodyPr wrap="none">
+            <a:spAutoFit/>
+          </a:bodyPr>
+          <a:lstStyle/>
           <a:p>
             <a:pPr>
-              <a:defRPr sz="2200">
+              <a:defRPr sz="2400" b="1">
+                <a:solidFill>
+                  <a:srgbClr val="E60000"/>
+                </a:solidFill>
+              </a:defRPr>
+            </a:pPr>
+            <a:r>
+              <a:t>Giai đoạn 3: Thực hiện sự kiện — T-7 đến T+1</a:t>
+            </a:r>
+          </a:p>
+          <a:p>
+            <a:pPr lvl="1">
+              <a:defRPr sz="1800">
                 <a:solidFill>
                   <a:srgbClr val="141414"/>
                 </a:solidFill>
               </a:defRPr>
             </a:pPr>
             <a:r>
-              <a:t>Hội thảo khoa học: Nghiên cứu và khẳng định giá trị lịch sử của Cách mạng Tháng Tám (Chủ trì: Viện Lịch sử Đảng)</a:t>
-            </a:r>
-          </a:p>
+              <a:t>  • Tổ chức Lễ Kỷ niệm chính thức, diễu binh, diễu hành cấp quốc gia</a:t>
+            </a:r>
+          </a:p>
+          <a:p>
+            <a:pPr lvl="1">
+              <a:defRPr sz="1800">
+                <a:solidFill>
+                  <a:srgbClr val="141414"/>
+                </a:solidFill>
+              </a:defRPr>
+            </a:pPr>
+            <a:r>
+              <a:t>  • Tổ chức Chương trình nghệ thuật đặc biệt vào tối 2/9</a:t>
+            </a:r>
+          </a:p>
+          <a:p>
+            <a:pPr lvl="1">
+              <a:defRPr sz="1800">
+                <a:solidFill>
+                  <a:srgbClr val="141414"/>
+                </a:solidFill>
+              </a:defRPr>
+            </a:pPr>
+            <a:r>
+              <a:t>  • Triển khai các phương án đảm bảo an ninh, an toàn tuyệt đối</a:t>
+            </a:r>
+          </a:p>
+          <a:p>
+            <a:pPr lvl="1">
+              <a:defRPr sz="1800">
+                <a:solidFill>
+                  <a:srgbClr val="141414"/>
+                </a:solidFill>
+              </a:defRPr>
+            </a:pPr>
+            <a:r>
+              <a:t>  • Truyền hình, phát thanh trực tiếp các sự kiện chính</a:t>
+            </a:r>
+          </a:p>
+        </p:txBody>
+      </p:sp>
+      <p:sp>
+        <p:nvSpPr>
+          <p:cNvPr id="7" name="TextBox 6"/>
+          <p:cNvSpPr txBox="1"/>
+          <p:nvPr/>
+        </p:nvSpPr>
+        <p:spPr>
+          <a:xfrm>
+            <a:off x="731520" y="4937760"/>
+            <a:ext cx="10789920" cy="914400"/>
+          </a:xfrm>
+          <a:prstGeom prst="rect">
+            <a:avLst/>
+          </a:prstGeom>
+          <a:noFill/>
+        </p:spPr>
+        <p:txBody>
+          <a:bodyPr wrap="none">
+            <a:spAutoFit/>
+          </a:bodyPr>
+          <a:lstStyle/>
           <a:p>
             <a:pPr>
-              <a:defRPr sz="2200">
+              <a:defRPr sz="2400" b="1">
+                <a:solidFill>
+                  <a:srgbClr val="E60000"/>
+                </a:solidFill>
+              </a:defRPr>
+            </a:pPr>
+            <a:r>
+              <a:t>Giai đoạn 4: Tổng kết và lan tỏa — T+1 đến T+30</a:t>
+            </a:r>
+          </a:p>
+          <a:p>
+            <a:pPr lvl="1">
+              <a:defRPr sz="1800">
                 <a:solidFill>
                   <a:srgbClr val="141414"/>
                 </a:solidFill>
               </a:defRPr>
             </a:pPr>
             <a:r>
-              <a:t>Chương trình văn hóa nghệ thuật: Tôn vinh tinh thần dân tộc qua các tác phẩm nghệ thuật (Chủ trì: Bộ Văn hóa, Thể thao và Du lịch)</a:t>
+              <a:t>  • Tổ chức họp tổng kết, đánh giá, rút kinh nghiệm</a:t>
+            </a:r>
+          </a:p>
+          <a:p>
+            <a:pPr lvl="1">
+              <a:defRPr sz="1800">
+                <a:solidFill>
+                  <a:srgbClr val="141414"/>
+                </a:solidFill>
+              </a:defRPr>
+            </a:pPr>
+            <a:r>
+              <a:t>  • Thực hiện công tác thi đua, khen thưởng cho các tập thể, cá nhân xuất sắc</a:t>
+            </a:r>
+          </a:p>
+          <a:p>
+            <a:pPr lvl="1">
+              <a:defRPr sz="1800">
+                <a:solidFill>
+                  <a:srgbClr val="141414"/>
+                </a:solidFill>
+              </a:defRPr>
+            </a:pPr>
+            <a:r>
+              <a:t>  • Hoàn tất thủ tục tài chính, quyết toán</a:t>
+            </a:r>
+          </a:p>
+          <a:p>
+            <a:pPr lvl="1">
+              <a:defRPr sz="1800">
+                <a:solidFill>
+                  <a:srgbClr val="141414"/>
+                </a:solidFill>
+              </a:defRPr>
+            </a:pPr>
+            <a:r>
+              <a:t>  • Sản xuất các sản phẩm truyền thông hậu sự kiện</a:t>
             </a:r>
           </a:p>
         </p:txBody>
@@ -5658,9 +6320,6 @@
           <a:solidFill>
             <a:srgbClr val="F8F8F8"/>
           </a:solidFill>
-          <a:ln>
-            <a:noFill/>
-          </a:ln>
         </p:spPr>
         <p:style>
           <a:lnRef idx="1">
@@ -5686,14 +6345,100 @@
       </p:sp>
       <p:sp>
         <p:nvSpPr>
-          <p:cNvPr id="3" name="TextBox 2"/>
+          <p:cNvPr id="3" name="5-Point Star 2"/>
+          <p:cNvSpPr/>
+          <p:nvPr/>
+        </p:nvSpPr>
+        <p:spPr>
+          <a:xfrm>
+            <a:off x="457200" y="457200"/>
+            <a:ext cx="914400" cy="914400"/>
+          </a:xfrm>
+          <a:prstGeom prst="star5">
+            <a:avLst/>
+          </a:prstGeom>
+          <a:solidFill>
+            <a:srgbClr val="FFD200"/>
+          </a:solidFill>
+          <a:ln>
+            <a:noFill/>
+          </a:ln>
+        </p:spPr>
+        <p:style>
+          <a:lnRef idx="1">
+            <a:schemeClr val="accent1"/>
+          </a:lnRef>
+          <a:fillRef idx="3">
+            <a:schemeClr val="accent1"/>
+          </a:fillRef>
+          <a:effectRef idx="2">
+            <a:schemeClr val="accent1"/>
+          </a:effectRef>
+          <a:fontRef idx="minor">
+            <a:schemeClr val="lt1"/>
+          </a:fontRef>
+        </p:style>
+        <p:txBody>
+          <a:bodyPr rtlCol="0" anchor="ctr"/>
+          <a:lstStyle/>
+          <a:p>
+            <a:pPr algn="ctr"/>
+          </a:p>
+        </p:txBody>
+      </p:sp>
+      <p:sp>
+        <p:nvSpPr>
+          <p:cNvPr id="4" name="Rectangle 3"/>
+          <p:cNvSpPr/>
+          <p:nvPr/>
+        </p:nvSpPr>
+        <p:spPr>
+          <a:xfrm>
+            <a:off x="91440" y="91440"/>
+            <a:ext cx="8961120" cy="6675120"/>
+          </a:xfrm>
+          <a:prstGeom prst="rect">
+            <a:avLst/>
+          </a:prstGeom>
+          <a:noFill/>
+          <a:ln w="38100">
+            <a:solidFill>
+              <a:srgbClr val="FFD200"/>
+            </a:solidFill>
+          </a:ln>
+        </p:spPr>
+        <p:style>
+          <a:lnRef idx="1">
+            <a:schemeClr val="accent1"/>
+          </a:lnRef>
+          <a:fillRef idx="3">
+            <a:schemeClr val="accent1"/>
+          </a:fillRef>
+          <a:effectRef idx="2">
+            <a:schemeClr val="accent1"/>
+          </a:effectRef>
+          <a:fontRef idx="minor">
+            <a:schemeClr val="lt1"/>
+          </a:fontRef>
+        </p:style>
+        <p:txBody>
+          <a:bodyPr rtlCol="0" anchor="ctr"/>
+          <a:lstStyle/>
+          <a:p>
+            <a:pPr algn="ctr"/>
+          </a:p>
+        </p:txBody>
+      </p:sp>
+      <p:sp>
+        <p:nvSpPr>
+          <p:cNvPr id="5" name="TextBox 4"/>
           <p:cNvSpPr txBox="1"/>
           <p:nvPr/>
         </p:nvSpPr>
         <p:spPr>
           <a:xfrm>
             <a:off x="731520" y="365760"/>
-            <a:ext cx="10789920" cy="914400"/>
+            <a:ext cx="10789920" cy="1097280"/>
           </a:xfrm>
           <a:prstGeom prst="rect">
             <a:avLst/>
@@ -5707,28 +6452,28 @@
           <a:lstStyle/>
           <a:p>
             <a:pPr algn="ctr">
-              <a:defRPr sz="3600" b="1">
+              <a:defRPr sz="3200" b="1">
                 <a:solidFill>
                   <a:srgbClr val="E60000"/>
                 </a:solidFill>
               </a:defRPr>
             </a:pPr>
             <a:r>
-              <a:t>Kế hoạch truyền thông</a:t>
-            </a:r>
-          </a:p>
-        </p:txBody>
-      </p:sp>
-      <p:sp>
-        <p:nvSpPr>
-          <p:cNvPr id="4" name="TextBox 3"/>
+              <a:t>Chương trình trọng điểm</a:t>
+            </a:r>
+          </a:p>
+        </p:txBody>
+      </p:sp>
+      <p:sp>
+        <p:nvSpPr>
+          <p:cNvPr id="6" name="TextBox 5"/>
           <p:cNvSpPr txBox="1"/>
           <p:nvPr/>
         </p:nvSpPr>
         <p:spPr>
           <a:xfrm>
-            <a:off x="731520" y="1280160"/>
-            <a:ext cx="5120640" cy="5120640"/>
+            <a:off x="731520" y="1645920"/>
+            <a:ext cx="10789920" cy="4572000"/>
           </a:xfrm>
           <a:prstGeom prst="rect">
             <a:avLst/>
@@ -5742,73 +6487,38 @@
           <a:lstStyle/>
           <a:p>
             <a:pPr>
-              <a:defRPr sz="2000">
+              <a:defRPr sz="2000" b="1">
                 <a:solidFill>
                   <a:srgbClr val="141414"/>
                 </a:solidFill>
               </a:defRPr>
             </a:pPr>
             <a:r>
-              <a:t>Truyền hình: Truyền hình trực tiếp lễ kỷ niệm và các hoạt động — Mốc: 2/9/2025 và các ngày trọng đại</a:t>
+              <a:t>🏛️ Lễ Míttinh, Diễu binh, Diễu hành cấp Quốc gia: Biểu dương sức mạnh đại đoàn kết toàn dân tộc, khẳng định thành tựu 80 năm (Chủ trì: Ban Tổ chức cấp Nhà nước)</a:t>
             </a:r>
           </a:p>
           <a:p>
             <a:pPr>
-              <a:defRPr sz="2000">
+              <a:defRPr sz="2000" b="1">
                 <a:solidFill>
                   <a:srgbClr val="141414"/>
                 </a:solidFill>
               </a:defRPr>
             </a:pPr>
             <a:r>
-              <a:t>Báo chí: Đưa tin toàn diện về các hoạt động kỷ niệm — Mốc: T-30 đến T+7</a:t>
+              <a:t>🏛️ Triển lãm '80 năm - Chặng đường vẻ vang': Trưng bày các tư liệu, hình ảnh, hiện vật quý giá về Cách mạng tháng Tám (Chủ trì: Bộ VHTTDL, Bảo tàng Lịch sử Quốc gia)</a:t>
             </a:r>
           </a:p>
           <a:p>
             <a:pPr>
-              <a:defRPr sz="2000">
+              <a:defRPr sz="2000" b="1">
                 <a:solidFill>
                   <a:srgbClr val="141414"/>
                 </a:solidFill>
               </a:defRPr>
             </a:pPr>
             <a:r>
-              <a:t>Mạng xã hội: Lan tỏa thông điệp yêu nước và tinh thần dân tộc — Mốc: T-60 đến T+30</a:t>
-            </a:r>
-          </a:p>
-        </p:txBody>
-      </p:sp>
-      <p:sp>
-        <p:nvSpPr>
-          <p:cNvPr id="5" name="TextBox 4"/>
-          <p:cNvSpPr txBox="1"/>
-          <p:nvPr/>
-        </p:nvSpPr>
-        <p:spPr>
-          <a:xfrm>
-            <a:off x="6035040" y="1280160"/>
-            <a:ext cx="5120640" cy="5120640"/>
-          </a:xfrm>
-          <a:prstGeom prst="rect">
-            <a:avLst/>
-          </a:prstGeom>
-          <a:noFill/>
-        </p:spPr>
-        <p:txBody>
-          <a:bodyPr wrap="none">
-            <a:spAutoFit/>
-          </a:bodyPr>
-          <a:lstStyle/>
-          <a:p>
-            <a:pPr>
-              <a:defRPr sz="2000">
-                <a:solidFill>
-                  <a:srgbClr val="141414"/>
-                </a:solidFill>
-              </a:defRPr>
-            </a:pPr>
-            <a:r>
-              <a:t>Tuyên truyền cơ sở: Tổ chức các buổi nói chuyện, triển lãm tại cơ sở — Mốc: T-45 đến T+15</a:t>
+              <a:t>🏛️ Chương trình nghệ thuật đặc biệt 'Việt Nam - Khát vọng Rồng bay': Tái hiện lịch sử hào hùng và thể hiện khát vọng phát triển của dân tộc (Chủ trì: Bộ VHTTDL, Đài Truyền hình Việt Nam)</a:t>
             </a:r>
           </a:p>
         </p:txBody>
@@ -5904,7 +6614,7 @@
               </a:defRPr>
             </a:pPr>
             <a:r>
-              <a:t>Hậu cần</a:t>
+              <a:t>Kế hoạch truyền thông</a:t>
             </a:r>
           </a:p>
         </p:txBody>
@@ -5918,7 +6628,7 @@
         <p:spPr>
           <a:xfrm>
             <a:off x="731520" y="1280160"/>
-            <a:ext cx="10789920" cy="5303520"/>
+            <a:ext cx="5120640" cy="5120640"/>
           </a:xfrm>
           <a:prstGeom prst="rect">
             <a:avLst/>
@@ -5932,50 +6642,61 @@
           <a:lstStyle/>
           <a:p>
             <a:pPr>
-              <a:defRPr sz="2200">
+              <a:defRPr sz="2000">
                 <a:solidFill>
                   <a:srgbClr val="141414"/>
                 </a:solidFill>
               </a:defRPr>
             </a:pPr>
             <a:r>
-              <a:t>Địa điểm tổ chức: Chuẩn bị sân khấu, ghế ngồi, hệ thống âm thanh ánh sáng — Hạn: T-15</a:t>
+              <a:t>Truyền hình: Truyền hình trực tiếp lễ kỷ niệm và các hoạt động — Mốc: 2/9/2025 và các ngày trọng đại</a:t>
             </a:r>
           </a:p>
           <a:p>
             <a:pPr>
-              <a:defRPr sz="2200">
+              <a:defRPr sz="2000">
                 <a:solidFill>
                   <a:srgbClr val="141414"/>
                 </a:solidFill>
               </a:defRPr>
             </a:pPr>
             <a:r>
-              <a:t>Vận chuyển: Đưa đón khách mời, vận chuyển thiết bị và hiện vật — Hạn: T-1</a:t>
-            </a:r>
-          </a:p>
+              <a:t>Báo chí: Đưa tin toàn diện về các hoạt động kỷ niệm — Mốc: T-30 đến T+7</a:t>
+            </a:r>
+          </a:p>
+        </p:txBody>
+      </p:sp>
+      <p:sp>
+        <p:nvSpPr>
+          <p:cNvPr id="5" name="TextBox 4"/>
+          <p:cNvSpPr txBox="1"/>
+          <p:nvPr/>
+        </p:nvSpPr>
+        <p:spPr>
+          <a:xfrm>
+            <a:off x="6035040" y="1280160"/>
+            <a:ext cx="5120640" cy="5120640"/>
+          </a:xfrm>
+          <a:prstGeom prst="rect">
+            <a:avLst/>
+          </a:prstGeom>
+          <a:noFill/>
+        </p:spPr>
+        <p:txBody>
+          <a:bodyPr wrap="none">
+            <a:spAutoFit/>
+          </a:bodyPr>
+          <a:lstStyle/>
           <a:p>
             <a:pPr>
-              <a:defRPr sz="2200">
+              <a:defRPr sz="2000">
                 <a:solidFill>
                   <a:srgbClr val="141414"/>
                 </a:solidFill>
               </a:defRPr>
             </a:pPr>
             <a:r>
-              <a:t>Catering: Phục vụ ăn uống cho khách mời và lực lượng tham gia — Hạn: T-7</a:t>
-            </a:r>
-          </a:p>
-          <a:p>
-            <a:pPr>
-              <a:defRPr sz="2200">
-                <a:solidFill>
-                  <a:srgbClr val="141414"/>
-                </a:solidFill>
-              </a:defRPr>
-            </a:pPr>
-            <a:r>
-              <a:t>An ninh: Bảo vệ an toàn tuyệt đối cho sự kiện — Hạn: T-3</a:t>
+              <a:t>Mạng xã hội: Lan tỏa thông điệp yêu nước và tinh thần dân tộc — Mốc: T-60 đến T+30</a:t>
             </a:r>
           </a:p>
         </p:txBody>
@@ -6071,7 +6792,7 @@
               </a:defRPr>
             </a:pPr>
             <a:r>
-              <a:t>Ngân sách (dự trù)</a:t>
+              <a:t>Hậu cần</a:t>
             </a:r>
           </a:p>
         </p:txBody>
@@ -6084,8 +6805,8 @@
         </p:nvSpPr>
         <p:spPr>
           <a:xfrm>
-            <a:off x="731520" y="1645920"/>
-            <a:ext cx="10789920" cy="731520"/>
+            <a:off x="731520" y="1280160"/>
+            <a:ext cx="10789920" cy="5303520"/>
           </a:xfrm>
           <a:prstGeom prst="rect">
             <a:avLst/>
@@ -6099,119 +6820,38 @@
           <a:lstStyle/>
           <a:p>
             <a:pPr>
-              <a:defRPr sz="2000">
+              <a:defRPr sz="2200">
                 <a:solidFill>
                   <a:srgbClr val="141414"/>
                 </a:solidFill>
               </a:defRPr>
             </a:pPr>
             <a:r>
-              <a:t>Tổ chức sự kiện: 2.000.000.000 VNĐ (Bao gồm thuê địa điểm, thiết bị, nhân lực)</a:t>
-            </a:r>
-          </a:p>
-        </p:txBody>
-      </p:sp>
-      <p:sp>
-        <p:nvSpPr>
-          <p:cNvPr id="5" name="TextBox 4"/>
-          <p:cNvSpPr txBox="1"/>
-          <p:nvPr/>
-        </p:nvSpPr>
-        <p:spPr>
-          <a:xfrm>
-            <a:off x="731520" y="2560320"/>
-            <a:ext cx="10789920" cy="731520"/>
-          </a:xfrm>
-          <a:prstGeom prst="rect">
-            <a:avLst/>
-          </a:prstGeom>
-          <a:noFill/>
-        </p:spPr>
-        <p:txBody>
-          <a:bodyPr wrap="none">
-            <a:spAutoFit/>
-          </a:bodyPr>
-          <a:lstStyle/>
+              <a:t>Địa điểm tổ chức: Chuẩn bị sân khấu, ghế ngồi, hệ thống âm thanh ánh sáng — Hạn: T-15</a:t>
+            </a:r>
+          </a:p>
           <a:p>
             <a:pPr>
-              <a:defRPr sz="2000">
+              <a:defRPr sz="2200">
                 <a:solidFill>
                   <a:srgbClr val="141414"/>
                 </a:solidFill>
               </a:defRPr>
             </a:pPr>
             <a:r>
-              <a:t>Truyền thông: 500.000.000 VNĐ (Quảng cáo, sản xuất nội dung, phát sóng)</a:t>
-            </a:r>
-          </a:p>
-        </p:txBody>
-      </p:sp>
-      <p:sp>
-        <p:nvSpPr>
-          <p:cNvPr id="6" name="TextBox 5"/>
-          <p:cNvSpPr txBox="1"/>
-          <p:nvPr/>
-        </p:nvSpPr>
-        <p:spPr>
-          <a:xfrm>
-            <a:off x="731520" y="3474720"/>
-            <a:ext cx="10789920" cy="731520"/>
-          </a:xfrm>
-          <a:prstGeom prst="rect">
-            <a:avLst/>
-          </a:prstGeom>
-          <a:noFill/>
-        </p:spPr>
-        <p:txBody>
-          <a:bodyPr wrap="none">
-            <a:spAutoFit/>
-          </a:bodyPr>
-          <a:lstStyle/>
+              <a:t>Vận chuyển: Đưa đón khách mời, vận chuyển thiết bị và hiện vật — Hạn: T-1</a:t>
+            </a:r>
+          </a:p>
           <a:p>
             <a:pPr>
-              <a:defRPr sz="2000">
+              <a:defRPr sz="2200">
                 <a:solidFill>
                   <a:srgbClr val="141414"/>
                 </a:solidFill>
               </a:defRPr>
             </a:pPr>
             <a:r>
-              <a:t>Hậu cần: 300.000.000 VNĐ (Vận chuyển, ăn uống, lưu trú)</a:t>
-            </a:r>
-          </a:p>
-        </p:txBody>
-      </p:sp>
-      <p:sp>
-        <p:nvSpPr>
-          <p:cNvPr id="7" name="TextBox 6"/>
-          <p:cNvSpPr txBox="1"/>
-          <p:nvPr/>
-        </p:nvSpPr>
-        <p:spPr>
-          <a:xfrm>
-            <a:off x="731520" y="4389120"/>
-            <a:ext cx="10789920" cy="731520"/>
-          </a:xfrm>
-          <a:prstGeom prst="rect">
-            <a:avLst/>
-          </a:prstGeom>
-          <a:noFill/>
-        </p:spPr>
-        <p:txBody>
-          <a:bodyPr wrap="none">
-            <a:spAutoFit/>
-          </a:bodyPr>
-          <a:lstStyle/>
-          <a:p>
-            <a:pPr>
-              <a:defRPr sz="2000">
-                <a:solidFill>
-                  <a:srgbClr val="141414"/>
-                </a:solidFill>
-              </a:defRPr>
-            </a:pPr>
-            <a:r>
-              <a:t>An ninh: 200.000.000 VNĐ (Bảo vệ, kiểm soát an ninh)</a:t>
+              <a:t>Catering: Phục vụ ăn uống cho khách mời và lực lượng tham gia — Hạn: T-7</a:t>
             </a:r>
           </a:p>
         </p:txBody>

</xml_diff>